<commit_message>
hier und da kleinigkeiten geändert
</commit_message>
<xml_diff>
--- a/Präsentation/Algorithmische Zahlentheorie Präsentation v.0.6.pptx
+++ b/Präsentation/Algorithmische Zahlentheorie Präsentation v.0.6.pptx
@@ -5,8 +5,11 @@
     <p:sldMasterId id="2147483648" r:id="rId1"/>
   </p:sldMasterIdLst>
   <p:notesMasterIdLst>
-    <p:notesMasterId r:id="rId27"/>
+    <p:notesMasterId r:id="rId28"/>
   </p:notesMasterIdLst>
+  <p:handoutMasterIdLst>
+    <p:handoutMasterId r:id="rId29"/>
+  </p:handoutMasterIdLst>
   <p:sldIdLst>
     <p:sldId id="257" r:id="rId2"/>
     <p:sldId id="256" r:id="rId3"/>
@@ -21,23 +24,24 @@
     <p:sldId id="283" r:id="rId12"/>
     <p:sldId id="284" r:id="rId13"/>
     <p:sldId id="285" r:id="rId14"/>
-    <p:sldId id="277" r:id="rId15"/>
-    <p:sldId id="263" r:id="rId16"/>
-    <p:sldId id="264" r:id="rId17"/>
-    <p:sldId id="265" r:id="rId18"/>
-    <p:sldId id="266" r:id="rId19"/>
-    <p:sldId id="267" r:id="rId20"/>
-    <p:sldId id="268" r:id="rId21"/>
-    <p:sldId id="270" r:id="rId22"/>
-    <p:sldId id="272" r:id="rId23"/>
-    <p:sldId id="273" r:id="rId24"/>
-    <p:sldId id="274" r:id="rId25"/>
-    <p:sldId id="275" r:id="rId26"/>
+    <p:sldId id="286" r:id="rId15"/>
+    <p:sldId id="277" r:id="rId16"/>
+    <p:sldId id="263" r:id="rId17"/>
+    <p:sldId id="264" r:id="rId18"/>
+    <p:sldId id="265" r:id="rId19"/>
+    <p:sldId id="266" r:id="rId20"/>
+    <p:sldId id="267" r:id="rId21"/>
+    <p:sldId id="268" r:id="rId22"/>
+    <p:sldId id="270" r:id="rId23"/>
+    <p:sldId id="272" r:id="rId24"/>
+    <p:sldId id="273" r:id="rId25"/>
+    <p:sldId id="274" r:id="rId26"/>
+    <p:sldId id="275" r:id="rId27"/>
   </p:sldIdLst>
   <p:sldSz cx="10693400" cy="7562850"/>
   <p:notesSz cx="6858000" cy="9144000"/>
   <p:custDataLst>
-    <p:tags r:id="rId28"/>
+    <p:tags r:id="rId30"/>
   </p:custDataLst>
   <p:defaultTextStyle>
     <a:defPPr>
@@ -246,7 +250,7 @@
 </file>
 
 <file path=ppt/charts/chart1.xml><?xml version="1.0" encoding="utf-8"?>
-<c:chartSpace xmlns:c="http://schemas.openxmlformats.org/drawingml/2006/chart" xmlns:a="http://schemas.openxmlformats.org/drawingml/2006/main" xmlns:r="http://schemas.openxmlformats.org/officeDocument/2006/relationships">
+<c:chartSpace xmlns:c="http://schemas.openxmlformats.org/drawingml/2006/chart" xmlns:a="http://schemas.openxmlformats.org/drawingml/2006/main" xmlns:r="http://schemas.openxmlformats.org/officeDocument/2006/relationships" xmlns:c16r2="http://schemas.microsoft.com/office/drawing/2015/06/chart">
   <c:date1904 val="0"/>
   <c:lang val="de-DE"/>
   <c:roundedCorners val="0"/>
@@ -314,7 +318,7 @@
                 <a:noFill/>
               </a:ln>
             </c:spPr>
-            <c:extLst xmlns:c16r2="http://schemas.microsoft.com/office/drawing/2015/06/chart">
+            <c:extLst>
               <c:ext xmlns:c16="http://schemas.microsoft.com/office/drawing/2014/chart" uri="{C3380CC4-5D6E-409C-BE32-E72D297353CC}">
                 <c16:uniqueId val="{00000001-33D6-4D65-AFA7-6FF568E97C3A}"/>
               </c:ext>
@@ -368,7 +372,7 @@
               </c:numCache>
             </c:numRef>
           </c:val>
-          <c:extLst xmlns:c16r2="http://schemas.microsoft.com/office/drawing/2015/06/chart">
+          <c:extLst>
             <c:ext xmlns:c16="http://schemas.microsoft.com/office/drawing/2014/chart" uri="{C3380CC4-5D6E-409C-BE32-E72D297353CC}">
               <c16:uniqueId val="{00000002-33D6-4D65-AFA7-6FF568E97C3A}"/>
             </c:ext>
@@ -487,7 +491,7 @@
 </file>
 
 <file path=ppt/charts/chart2.xml><?xml version="1.0" encoding="utf-8"?>
-<c:chartSpace xmlns:c="http://schemas.openxmlformats.org/drawingml/2006/chart" xmlns:a="http://schemas.openxmlformats.org/drawingml/2006/main" xmlns:r="http://schemas.openxmlformats.org/officeDocument/2006/relationships">
+<c:chartSpace xmlns:c="http://schemas.openxmlformats.org/drawingml/2006/chart" xmlns:a="http://schemas.openxmlformats.org/drawingml/2006/main" xmlns:r="http://schemas.openxmlformats.org/officeDocument/2006/relationships" xmlns:c16r2="http://schemas.microsoft.com/office/drawing/2015/06/chart">
   <c:date1904 val="0"/>
   <c:lang val="de-DE"/>
   <c:roundedCorners val="0"/>
@@ -540,7 +544,7 @@
           <c:dPt>
             <c:idx val="0"/>
             <c:bubble3D val="0"/>
-            <c:extLst xmlns:c16r2="http://schemas.microsoft.com/office/drawing/2015/06/chart">
+            <c:extLst>
               <c:ext xmlns:c16="http://schemas.microsoft.com/office/drawing/2014/chart" uri="{C3380CC4-5D6E-409C-BE32-E72D297353CC}">
                 <c16:uniqueId val="{00000000-B7E5-4D33-ABD9-EBE0C229A760}"/>
               </c:ext>
@@ -557,7 +561,7 @@
                 <a:noFill/>
               </a:ln>
             </c:spPr>
-            <c:extLst xmlns:c16r2="http://schemas.microsoft.com/office/drawing/2015/06/chart">
+            <c:extLst>
               <c:ext xmlns:c16="http://schemas.microsoft.com/office/drawing/2014/chart" uri="{C3380CC4-5D6E-409C-BE32-E72D297353CC}">
                 <c16:uniqueId val="{00000002-B7E5-4D33-ABD9-EBE0C229A760}"/>
               </c:ext>
@@ -574,7 +578,7 @@
                 <a:noFill/>
               </a:ln>
             </c:spPr>
-            <c:extLst xmlns:c16r2="http://schemas.microsoft.com/office/drawing/2015/06/chart">
+            <c:extLst>
               <c:ext xmlns:c16="http://schemas.microsoft.com/office/drawing/2014/chart" uri="{C3380CC4-5D6E-409C-BE32-E72D297353CC}">
                 <c16:uniqueId val="{00000004-B7E5-4D33-ABD9-EBE0C229A760}"/>
               </c:ext>
@@ -591,7 +595,7 @@
                 <a:noFill/>
               </a:ln>
             </c:spPr>
-            <c:extLst xmlns:c16r2="http://schemas.microsoft.com/office/drawing/2015/06/chart">
+            <c:extLst>
               <c:ext xmlns:c16="http://schemas.microsoft.com/office/drawing/2014/chart" uri="{C3380CC4-5D6E-409C-BE32-E72D297353CC}">
                 <c16:uniqueId val="{00000006-B7E5-4D33-ABD9-EBE0C229A760}"/>
               </c:ext>
@@ -608,7 +612,7 @@
                 <a:noFill/>
               </a:ln>
             </c:spPr>
-            <c:extLst xmlns:c16r2="http://schemas.microsoft.com/office/drawing/2015/06/chart">
+            <c:extLst>
               <c:ext xmlns:c16="http://schemas.microsoft.com/office/drawing/2014/chart" uri="{C3380CC4-5D6E-409C-BE32-E72D297353CC}">
                 <c16:uniqueId val="{00000008-B7E5-4D33-ABD9-EBE0C229A760}"/>
               </c:ext>
@@ -630,11 +634,11 @@
               <c:showSerName val="0"/>
               <c:showPercent val="1"/>
               <c:showBubbleSize val="0"/>
-              <c:extLst xmlns:c16r2="http://schemas.microsoft.com/office/drawing/2015/06/chart">
+              <c:extLst>
+                <c:ext xmlns:c15="http://schemas.microsoft.com/office/drawing/2012/chart" uri="{CE6537A1-D6FC-4f65-9D91-7224C49458BB}"/>
                 <c:ext xmlns:c16="http://schemas.microsoft.com/office/drawing/2014/chart" uri="{C3380CC4-5D6E-409C-BE32-E72D297353CC}">
                   <c16:uniqueId val="{00000000-B7E5-4D33-ABD9-EBE0C229A760}"/>
                 </c:ext>
-                <c:ext xmlns:c15="http://schemas.microsoft.com/office/drawing/2012/chart" uri="{CE6537A1-D6FC-4f65-9D91-7224C49458BB}"/>
               </c:extLst>
             </c:dLbl>
             <c:dLbl>
@@ -652,11 +656,11 @@
               <c:showSerName val="0"/>
               <c:showPercent val="1"/>
               <c:showBubbleSize val="0"/>
-              <c:extLst xmlns:c16r2="http://schemas.microsoft.com/office/drawing/2015/06/chart">
+              <c:extLst>
+                <c:ext xmlns:c15="http://schemas.microsoft.com/office/drawing/2012/chart" uri="{CE6537A1-D6FC-4f65-9D91-7224C49458BB}"/>
                 <c:ext xmlns:c16="http://schemas.microsoft.com/office/drawing/2014/chart" uri="{C3380CC4-5D6E-409C-BE32-E72D297353CC}">
                   <c16:uniqueId val="{00000002-B7E5-4D33-ABD9-EBE0C229A760}"/>
                 </c:ext>
-                <c:ext xmlns:c15="http://schemas.microsoft.com/office/drawing/2012/chart" uri="{CE6537A1-D6FC-4f65-9D91-7224C49458BB}"/>
               </c:extLst>
             </c:dLbl>
             <c:dLbl>
@@ -674,11 +678,11 @@
               <c:showSerName val="0"/>
               <c:showPercent val="1"/>
               <c:showBubbleSize val="0"/>
-              <c:extLst xmlns:c16r2="http://schemas.microsoft.com/office/drawing/2015/06/chart">
+              <c:extLst>
+                <c:ext xmlns:c15="http://schemas.microsoft.com/office/drawing/2012/chart" uri="{CE6537A1-D6FC-4f65-9D91-7224C49458BB}"/>
                 <c:ext xmlns:c16="http://schemas.microsoft.com/office/drawing/2014/chart" uri="{C3380CC4-5D6E-409C-BE32-E72D297353CC}">
                   <c16:uniqueId val="{00000004-B7E5-4D33-ABD9-EBE0C229A760}"/>
                 </c:ext>
-                <c:ext xmlns:c15="http://schemas.microsoft.com/office/drawing/2012/chart" uri="{CE6537A1-D6FC-4f65-9D91-7224C49458BB}"/>
               </c:extLst>
             </c:dLbl>
             <c:dLbl>
@@ -696,11 +700,11 @@
               <c:showSerName val="0"/>
               <c:showPercent val="1"/>
               <c:showBubbleSize val="0"/>
-              <c:extLst xmlns:c16r2="http://schemas.microsoft.com/office/drawing/2015/06/chart">
+              <c:extLst>
+                <c:ext xmlns:c15="http://schemas.microsoft.com/office/drawing/2012/chart" uri="{CE6537A1-D6FC-4f65-9D91-7224C49458BB}"/>
                 <c:ext xmlns:c16="http://schemas.microsoft.com/office/drawing/2014/chart" uri="{C3380CC4-5D6E-409C-BE32-E72D297353CC}">
                   <c16:uniqueId val="{00000006-B7E5-4D33-ABD9-EBE0C229A760}"/>
                 </c:ext>
-                <c:ext xmlns:c15="http://schemas.microsoft.com/office/drawing/2012/chart" uri="{CE6537A1-D6FC-4f65-9D91-7224C49458BB}"/>
               </c:extLst>
             </c:dLbl>
             <c:dLbl>
@@ -718,11 +722,11 @@
               <c:showSerName val="0"/>
               <c:showPercent val="1"/>
               <c:showBubbleSize val="0"/>
-              <c:extLst xmlns:c16r2="http://schemas.microsoft.com/office/drawing/2015/06/chart">
+              <c:extLst>
+                <c:ext xmlns:c15="http://schemas.microsoft.com/office/drawing/2012/chart" uri="{CE6537A1-D6FC-4f65-9D91-7224C49458BB}"/>
                 <c:ext xmlns:c16="http://schemas.microsoft.com/office/drawing/2014/chart" uri="{C3380CC4-5D6E-409C-BE32-E72D297353CC}">
                   <c16:uniqueId val="{00000008-B7E5-4D33-ABD9-EBE0C229A760}"/>
                 </c:ext>
-                <c:ext xmlns:c15="http://schemas.microsoft.com/office/drawing/2012/chart" uri="{CE6537A1-D6FC-4f65-9D91-7224C49458BB}"/>
               </c:extLst>
             </c:dLbl>
             <c:numFmt formatCode="0%" sourceLinked="0"/>
@@ -756,7 +760,7 @@
             <c:showPercent val="1"/>
             <c:showBubbleSize val="0"/>
             <c:showLeaderLines val="0"/>
-            <c:extLst xmlns:c16r2="http://schemas.microsoft.com/office/drawing/2015/06/chart">
+            <c:extLst>
               <c:ext xmlns:c15="http://schemas.microsoft.com/office/drawing/2012/chart" uri="{CE6537A1-D6FC-4f65-9D91-7224C49458BB}"/>
             </c:extLst>
           </c:dLbls>
@@ -807,7 +811,7 @@
               </c:numCache>
             </c:numRef>
           </c:val>
-          <c:extLst xmlns:c16r2="http://schemas.microsoft.com/office/drawing/2015/06/chart">
+          <c:extLst>
             <c:ext xmlns:c16="http://schemas.microsoft.com/office/drawing/2014/chart" uri="{C3380CC4-5D6E-409C-BE32-E72D297353CC}">
               <c16:uniqueId val="{00000009-B7E5-4D33-ABD9-EBE0C229A760}"/>
             </c:ext>
@@ -905,7 +909,7 @@
 </file>
 
 <file path=ppt/charts/chart3.xml><?xml version="1.0" encoding="utf-8"?>
-<c:chartSpace xmlns:c="http://schemas.openxmlformats.org/drawingml/2006/chart" xmlns:a="http://schemas.openxmlformats.org/drawingml/2006/main" xmlns:r="http://schemas.openxmlformats.org/officeDocument/2006/relationships">
+<c:chartSpace xmlns:c="http://schemas.openxmlformats.org/drawingml/2006/chart" xmlns:a="http://schemas.openxmlformats.org/drawingml/2006/main" xmlns:r="http://schemas.openxmlformats.org/officeDocument/2006/relationships" xmlns:c16r2="http://schemas.microsoft.com/office/drawing/2015/06/chart">
   <c:date1904 val="0"/>
   <c:lang val="de-DE"/>
   <c:roundedCorners val="0"/>
@@ -970,7 +974,7 @@
                 <a:prstDash val="lgDash"/>
               </a:ln>
             </c:spPr>
-            <c:extLst xmlns:c16r2="http://schemas.microsoft.com/office/drawing/2015/06/chart">
+            <c:extLst>
               <c:ext xmlns:c16="http://schemas.microsoft.com/office/drawing/2014/chart" uri="{C3380CC4-5D6E-409C-BE32-E72D297353CC}">
                 <c16:uniqueId val="{00000001-D7A8-4134-8B2B-E1954010A13D}"/>
               </c:ext>
@@ -987,7 +991,7 @@
                 <a:prstDash val="lgDash"/>
               </a:ln>
             </c:spPr>
-            <c:extLst xmlns:c16r2="http://schemas.microsoft.com/office/drawing/2015/06/chart">
+            <c:extLst>
               <c:ext xmlns:c16="http://schemas.microsoft.com/office/drawing/2014/chart" uri="{C3380CC4-5D6E-409C-BE32-E72D297353CC}">
                 <c16:uniqueId val="{00000003-D7A8-4134-8B2B-E1954010A13D}"/>
               </c:ext>
@@ -1004,7 +1008,7 @@
                 <a:prstDash val="lgDash"/>
               </a:ln>
             </c:spPr>
-            <c:extLst xmlns:c16r2="http://schemas.microsoft.com/office/drawing/2015/06/chart">
+            <c:extLst>
               <c:ext xmlns:c16="http://schemas.microsoft.com/office/drawing/2014/chart" uri="{C3380CC4-5D6E-409C-BE32-E72D297353CC}">
                 <c16:uniqueId val="{00000005-D7A8-4134-8B2B-E1954010A13D}"/>
               </c:ext>
@@ -1021,7 +1025,7 @@
                 <a:prstDash val="lgDash"/>
               </a:ln>
             </c:spPr>
-            <c:extLst xmlns:c16r2="http://schemas.microsoft.com/office/drawing/2015/06/chart">
+            <c:extLst>
               <c:ext xmlns:c16="http://schemas.microsoft.com/office/drawing/2014/chart" uri="{C3380CC4-5D6E-409C-BE32-E72D297353CC}">
                 <c16:uniqueId val="{00000007-D7A8-4134-8B2B-E1954010A13D}"/>
               </c:ext>
@@ -1076,7 +1080,7 @@
             </c:numRef>
           </c:val>
           <c:smooth val="0"/>
-          <c:extLst xmlns:c16r2="http://schemas.microsoft.com/office/drawing/2015/06/chart">
+          <c:extLst>
             <c:ext xmlns:c16="http://schemas.microsoft.com/office/drawing/2014/chart" uri="{C3380CC4-5D6E-409C-BE32-E72D297353CC}">
               <c16:uniqueId val="{00000008-D7A8-4134-8B2B-E1954010A13D}"/>
             </c:ext>
@@ -1156,7 +1160,7 @@
             </c:numRef>
           </c:val>
           <c:smooth val="0"/>
-          <c:extLst xmlns:c16r2="http://schemas.microsoft.com/office/drawing/2015/06/chart">
+          <c:extLst>
             <c:ext xmlns:c16="http://schemas.microsoft.com/office/drawing/2014/chart" uri="{C3380CC4-5D6E-409C-BE32-E72D297353CC}">
               <c16:uniqueId val="{00000009-D7A8-4134-8B2B-E1954010A13D}"/>
             </c:ext>
@@ -1236,7 +1240,7 @@
             </c:numRef>
           </c:val>
           <c:smooth val="0"/>
-          <c:extLst xmlns:c16r2="http://schemas.microsoft.com/office/drawing/2015/06/chart">
+          <c:extLst>
             <c:ext xmlns:c16="http://schemas.microsoft.com/office/drawing/2014/chart" uri="{C3380CC4-5D6E-409C-BE32-E72D297353CC}">
               <c16:uniqueId val="{0000000A-D7A8-4134-8B2B-E1954010A13D}"/>
             </c:ext>
@@ -1477,7 +1481,7 @@
         </a:ln>
         <a:extLst xmlns:a="http://schemas.openxmlformats.org/drawingml/2006/main">
           <a:ext uri="{909E8E84-426E-40dd-AFC4-6F175D3DCCD1}">
-            <a14:hiddenFill xmlns="" xmlns:a14="http://schemas.microsoft.com/office/drawing/2010/main">
+            <a14:hiddenFill xmlns:a14="http://schemas.microsoft.com/office/drawing/2010/main" xmlns="">
               <a:noFill/>
             </a14:hiddenFill>
           </a:ext>
@@ -1521,7 +1525,7 @@
         </a:ln>
         <a:extLst xmlns:a="http://schemas.openxmlformats.org/drawingml/2006/main">
           <a:ext uri="{909E8E84-426E-40dd-AFC4-6F175D3DCCD1}">
-            <a14:hiddenFill xmlns="" xmlns:a14="http://schemas.microsoft.com/office/drawing/2010/main">
+            <a14:hiddenFill xmlns:a14="http://schemas.microsoft.com/office/drawing/2010/main" xmlns="">
               <a:noFill/>
             </a14:hiddenFill>
           </a:ext>
@@ -1565,7 +1569,7 @@
         </a:ln>
         <a:extLst xmlns:a="http://schemas.openxmlformats.org/drawingml/2006/main">
           <a:ext uri="{909E8E84-426E-40dd-AFC4-6F175D3DCCD1}">
-            <a14:hiddenFill xmlns="" xmlns:a14="http://schemas.microsoft.com/office/drawing/2010/main">
+            <a14:hiddenFill xmlns:a14="http://schemas.microsoft.com/office/drawing/2010/main" xmlns="">
               <a:noFill/>
             </a14:hiddenFill>
           </a:ext>
@@ -1609,7 +1613,7 @@
         </a:ln>
         <a:extLst xmlns:a="http://schemas.openxmlformats.org/drawingml/2006/main">
           <a:ext uri="{909E8E84-426E-40dd-AFC4-6F175D3DCCD1}">
-            <a14:hiddenFill xmlns="" xmlns:a14="http://schemas.microsoft.com/office/drawing/2010/main">
+            <a14:hiddenFill xmlns:a14="http://schemas.microsoft.com/office/drawing/2010/main" xmlns="">
               <a:noFill/>
             </a14:hiddenFill>
           </a:ext>
@@ -1653,7 +1657,7 @@
         </a:ln>
         <a:extLst xmlns:a="http://schemas.openxmlformats.org/drawingml/2006/main">
           <a:ext uri="{909E8E84-426E-40dd-AFC4-6F175D3DCCD1}">
-            <a14:hiddenFill xmlns="" xmlns:a14="http://schemas.microsoft.com/office/drawing/2010/main">
+            <a14:hiddenFill xmlns:a14="http://schemas.microsoft.com/office/drawing/2010/main" xmlns="">
               <a:noFill/>
             </a14:hiddenFill>
           </a:ext>
@@ -1662,6 +1666,171 @@
     </cdr:sp>
   </cdr:relSizeAnchor>
 </c:userShapes>
+</file>
+
+<file path=ppt/handoutMasters/handoutMaster1.xml><?xml version="1.0" encoding="utf-8"?>
+<p:handoutMaster xmlns:a="http://schemas.openxmlformats.org/drawingml/2006/main" xmlns:r="http://schemas.openxmlformats.org/officeDocument/2006/relationships" xmlns:p="http://schemas.openxmlformats.org/presentationml/2006/main">
+  <p:cSld>
+    <p:bg>
+      <p:bgRef idx="1001">
+        <a:schemeClr val="bg1"/>
+      </p:bgRef>
+    </p:bg>
+    <p:spTree>
+      <p:nvGrpSpPr>
+        <p:cNvPr id="1" name=""/>
+        <p:cNvGrpSpPr/>
+        <p:nvPr/>
+      </p:nvGrpSpPr>
+      <p:grpSpPr>
+        <a:xfrm>
+          <a:off x="0" y="0"/>
+          <a:ext cx="0" cy="0"/>
+          <a:chOff x="0" y="0"/>
+          <a:chExt cx="0" cy="0"/>
+        </a:xfrm>
+      </p:grpSpPr>
+      <p:sp>
+        <p:nvSpPr>
+          <p:cNvPr id="2" name="Kopfzeilenplatzhalter 1"/>
+          <p:cNvSpPr>
+            <a:spLocks noGrp="1"/>
+          </p:cNvSpPr>
+          <p:nvPr>
+            <p:ph type="hdr" sz="quarter"/>
+          </p:nvPr>
+        </p:nvSpPr>
+        <p:spPr>
+          <a:xfrm>
+            <a:off x="0" y="0"/>
+            <a:ext cx="2971800" cy="458788"/>
+          </a:xfrm>
+          <a:prstGeom prst="rect">
+            <a:avLst/>
+          </a:prstGeom>
+        </p:spPr>
+        <p:txBody>
+          <a:bodyPr vert="horz" lIns="91440" tIns="45720" rIns="91440" bIns="45720" rtlCol="0"/>
+          <a:lstStyle>
+            <a:lvl1pPr algn="l">
+              <a:defRPr sz="1200"/>
+            </a:lvl1pPr>
+          </a:lstStyle>
+          <a:p>
+            <a:endParaRPr lang="de-DE"/>
+          </a:p>
+        </p:txBody>
+      </p:sp>
+      <p:sp>
+        <p:nvSpPr>
+          <p:cNvPr id="3" name="Datumsplatzhalter 2"/>
+          <p:cNvSpPr>
+            <a:spLocks noGrp="1"/>
+          </p:cNvSpPr>
+          <p:nvPr>
+            <p:ph type="dt" sz="quarter" idx="1"/>
+          </p:nvPr>
+        </p:nvSpPr>
+        <p:spPr>
+          <a:xfrm>
+            <a:off x="3884613" y="0"/>
+            <a:ext cx="2971800" cy="458788"/>
+          </a:xfrm>
+          <a:prstGeom prst="rect">
+            <a:avLst/>
+          </a:prstGeom>
+        </p:spPr>
+        <p:txBody>
+          <a:bodyPr vert="horz" lIns="91440" tIns="45720" rIns="91440" bIns="45720" rtlCol="0"/>
+          <a:lstStyle>
+            <a:lvl1pPr algn="r">
+              <a:defRPr sz="1200"/>
+            </a:lvl1pPr>
+          </a:lstStyle>
+          <a:p>
+            <a:fld id="{972F0399-DA99-4994-B6F0-DF1BD4F17C8C}" type="datetimeFigureOut">
+              <a:rPr lang="de-DE" smtClean="0"/>
+              <a:t>05.01.2016</a:t>
+            </a:fld>
+            <a:endParaRPr lang="de-DE"/>
+          </a:p>
+        </p:txBody>
+      </p:sp>
+      <p:sp>
+        <p:nvSpPr>
+          <p:cNvPr id="4" name="Fußzeilenplatzhalter 3"/>
+          <p:cNvSpPr>
+            <a:spLocks noGrp="1"/>
+          </p:cNvSpPr>
+          <p:nvPr>
+            <p:ph type="ftr" sz="quarter" idx="2"/>
+          </p:nvPr>
+        </p:nvSpPr>
+        <p:spPr>
+          <a:xfrm>
+            <a:off x="0" y="8685213"/>
+            <a:ext cx="2971800" cy="458787"/>
+          </a:xfrm>
+          <a:prstGeom prst="rect">
+            <a:avLst/>
+          </a:prstGeom>
+        </p:spPr>
+        <p:txBody>
+          <a:bodyPr vert="horz" lIns="91440" tIns="45720" rIns="91440" bIns="45720" rtlCol="0" anchor="b"/>
+          <a:lstStyle>
+            <a:lvl1pPr algn="l">
+              <a:defRPr sz="1200"/>
+            </a:lvl1pPr>
+          </a:lstStyle>
+          <a:p>
+            <a:endParaRPr lang="de-DE"/>
+          </a:p>
+        </p:txBody>
+      </p:sp>
+      <p:sp>
+        <p:nvSpPr>
+          <p:cNvPr id="5" name="Foliennummernplatzhalter 4"/>
+          <p:cNvSpPr>
+            <a:spLocks noGrp="1"/>
+          </p:cNvSpPr>
+          <p:nvPr>
+            <p:ph type="sldNum" sz="quarter" idx="3"/>
+          </p:nvPr>
+        </p:nvSpPr>
+        <p:spPr>
+          <a:xfrm>
+            <a:off x="3884613" y="8685213"/>
+            <a:ext cx="2971800" cy="458787"/>
+          </a:xfrm>
+          <a:prstGeom prst="rect">
+            <a:avLst/>
+          </a:prstGeom>
+        </p:spPr>
+        <p:txBody>
+          <a:bodyPr vert="horz" lIns="91440" tIns="45720" rIns="91440" bIns="45720" rtlCol="0" anchor="b"/>
+          <a:lstStyle>
+            <a:lvl1pPr algn="r">
+              <a:defRPr sz="1200"/>
+            </a:lvl1pPr>
+          </a:lstStyle>
+          <a:p>
+            <a:fld id="{D518AC4A-4ECD-4B7C-8BFD-9A6FDBE83BDB}" type="slidenum">
+              <a:rPr lang="de-DE" smtClean="0"/>
+              <a:t>‹Nr.›</a:t>
+            </a:fld>
+            <a:endParaRPr lang="de-DE"/>
+          </a:p>
+        </p:txBody>
+      </p:sp>
+    </p:spTree>
+    <p:extLst>
+      <p:ext uri="{BB962C8B-B14F-4D97-AF65-F5344CB8AC3E}">
+        <p14:creationId xmlns:p14="http://schemas.microsoft.com/office/powerpoint/2010/main" val="14159636"/>
+      </p:ext>
+    </p:extLst>
+  </p:cSld>
+  <p:clrMap bg1="lt1" tx1="dk1" bg2="lt2" tx2="dk2" accent1="accent1" accent2="accent2" accent3="accent3" accent4="accent4" accent5="accent5" accent6="accent6" hlink="hlink" folHlink="folHlink"/>
+</p:handoutMaster>
 </file>
 
 <file path=ppt/notesMasters/notesMaster1.xml><?xml version="1.0" encoding="utf-8"?>
@@ -1714,14 +1883,14 @@
           <a:effectLst/>
           <a:extLst>
             <a:ext uri="{909E8E84-426E-40dd-AFC4-6F175D3DCCD1}">
-              <a14:hiddenFill xmlns="" xmlns:a14="http://schemas.microsoft.com/office/drawing/2010/main">
+              <a14:hiddenFill xmlns:a14="http://schemas.microsoft.com/office/drawing/2010/main" xmlns="">
                 <a:solidFill>
                   <a:schemeClr val="accent1"/>
                 </a:solidFill>
               </a14:hiddenFill>
             </a:ext>
             <a:ext uri="{91240B29-F687-4f45-9708-019B960494DF}">
-              <a14:hiddenLine xmlns="" xmlns:a14="http://schemas.microsoft.com/office/drawing/2010/main" w="9525">
+              <a14:hiddenLine xmlns:a14="http://schemas.microsoft.com/office/drawing/2010/main" xmlns="" w="9525">
                 <a:solidFill>
                   <a:schemeClr val="tx1"/>
                 </a:solidFill>
@@ -1731,7 +1900,7 @@
               </a14:hiddenLine>
             </a:ext>
             <a:ext uri="{AF507438-7753-43e0-B8FC-AC1667EBCBE1}">
-              <a14:hiddenEffects xmlns="" xmlns:a14="http://schemas.microsoft.com/office/drawing/2010/main">
+              <a14:hiddenEffects xmlns:a14="http://schemas.microsoft.com/office/drawing/2010/main" xmlns="">
                 <a:effectLst>
                   <a:outerShdw dist="35921" dir="2700000" algn="ctr" rotWithShape="0">
                     <a:schemeClr val="bg2"/>
@@ -1782,14 +1951,14 @@
           <a:effectLst/>
           <a:extLst>
             <a:ext uri="{909E8E84-426E-40dd-AFC4-6F175D3DCCD1}">
-              <a14:hiddenFill xmlns="" xmlns:a14="http://schemas.microsoft.com/office/drawing/2010/main">
+              <a14:hiddenFill xmlns:a14="http://schemas.microsoft.com/office/drawing/2010/main" xmlns="">
                 <a:solidFill>
                   <a:schemeClr val="accent1"/>
                 </a:solidFill>
               </a14:hiddenFill>
             </a:ext>
             <a:ext uri="{91240B29-F687-4f45-9708-019B960494DF}">
-              <a14:hiddenLine xmlns="" xmlns:a14="http://schemas.microsoft.com/office/drawing/2010/main" w="9525">
+              <a14:hiddenLine xmlns:a14="http://schemas.microsoft.com/office/drawing/2010/main" xmlns="" w="9525">
                 <a:solidFill>
                   <a:schemeClr val="tx1"/>
                 </a:solidFill>
@@ -1799,7 +1968,7 @@
               </a14:hiddenLine>
             </a:ext>
             <a:ext uri="{AF507438-7753-43e0-B8FC-AC1667EBCBE1}">
-              <a14:hiddenEffects xmlns="" xmlns:a14="http://schemas.microsoft.com/office/drawing/2010/main">
+              <a14:hiddenEffects xmlns:a14="http://schemas.microsoft.com/office/drawing/2010/main" xmlns="">
                 <a:effectLst>
                   <a:outerShdw dist="35921" dir="2700000" algn="ctr" rotWithShape="0">
                     <a:schemeClr val="bg2"/>
@@ -1855,7 +2024,7 @@
           <a:effectLst/>
           <a:extLst>
             <a:ext uri="{AF507438-7753-43e0-B8FC-AC1667EBCBE1}">
-              <a14:hiddenEffects xmlns="" xmlns:a14="http://schemas.microsoft.com/office/drawing/2010/main">
+              <a14:hiddenEffects xmlns:a14="http://schemas.microsoft.com/office/drawing/2010/main" xmlns="">
                 <a:effectLst>
                   <a:outerShdw dist="35921" dir="2700000" algn="ctr" rotWithShape="0">
                     <a:srgbClr val="808080"/>
@@ -1864,7 +2033,7 @@
               </a14:hiddenEffects>
             </a:ext>
             <a:ext uri="{53640926-AAD7-44d8-BBD7-CCE9431645EC}">
-              <a14:shadowObscured xmlns="" xmlns:a14="http://schemas.microsoft.com/office/drawing/2010/main" val="1"/>
+              <a14:shadowObscured xmlns:a14="http://schemas.microsoft.com/office/drawing/2010/main" xmlns="" val="1"/>
             </a:ext>
           </a:extLst>
         </p:spPr>
@@ -1894,14 +2063,14 @@
           <a:effectLst/>
           <a:extLst>
             <a:ext uri="{909E8E84-426E-40dd-AFC4-6F175D3DCCD1}">
-              <a14:hiddenFill xmlns="" xmlns:a14="http://schemas.microsoft.com/office/drawing/2010/main">
+              <a14:hiddenFill xmlns:a14="http://schemas.microsoft.com/office/drawing/2010/main" xmlns="">
                 <a:solidFill>
                   <a:schemeClr val="accent1"/>
                 </a:solidFill>
               </a14:hiddenFill>
             </a:ext>
             <a:ext uri="{91240B29-F687-4f45-9708-019B960494DF}">
-              <a14:hiddenLine xmlns="" xmlns:a14="http://schemas.microsoft.com/office/drawing/2010/main" w="9525">
+              <a14:hiddenLine xmlns:a14="http://schemas.microsoft.com/office/drawing/2010/main" xmlns="" w="9525">
                 <a:solidFill>
                   <a:schemeClr val="tx1"/>
                 </a:solidFill>
@@ -1911,7 +2080,7 @@
               </a14:hiddenLine>
             </a:ext>
             <a:ext uri="{AF507438-7753-43e0-B8FC-AC1667EBCBE1}">
-              <a14:hiddenEffects xmlns="" xmlns:a14="http://schemas.microsoft.com/office/drawing/2010/main">
+              <a14:hiddenEffects xmlns:a14="http://schemas.microsoft.com/office/drawing/2010/main" xmlns="">
                 <a:effectLst>
                   <a:outerShdw dist="35921" dir="2700000" algn="ctr" rotWithShape="0">
                     <a:schemeClr val="bg2"/>
@@ -1990,14 +2159,14 @@
           <a:effectLst/>
           <a:extLst>
             <a:ext uri="{909E8E84-426E-40dd-AFC4-6F175D3DCCD1}">
-              <a14:hiddenFill xmlns="" xmlns:a14="http://schemas.microsoft.com/office/drawing/2010/main">
+              <a14:hiddenFill xmlns:a14="http://schemas.microsoft.com/office/drawing/2010/main" xmlns="">
                 <a:solidFill>
                   <a:schemeClr val="accent1"/>
                 </a:solidFill>
               </a14:hiddenFill>
             </a:ext>
             <a:ext uri="{91240B29-F687-4f45-9708-019B960494DF}">
-              <a14:hiddenLine xmlns="" xmlns:a14="http://schemas.microsoft.com/office/drawing/2010/main" w="9525">
+              <a14:hiddenLine xmlns:a14="http://schemas.microsoft.com/office/drawing/2010/main" xmlns="" w="9525">
                 <a:solidFill>
                   <a:schemeClr val="tx1"/>
                 </a:solidFill>
@@ -2007,7 +2176,7 @@
               </a14:hiddenLine>
             </a:ext>
             <a:ext uri="{AF507438-7753-43e0-B8FC-AC1667EBCBE1}">
-              <a14:hiddenEffects xmlns="" xmlns:a14="http://schemas.microsoft.com/office/drawing/2010/main">
+              <a14:hiddenEffects xmlns:a14="http://schemas.microsoft.com/office/drawing/2010/main" xmlns="">
                 <a:effectLst>
                   <a:outerShdw dist="35921" dir="2700000" algn="ctr" rotWithShape="0">
                     <a:schemeClr val="bg2"/>
@@ -2058,14 +2227,14 @@
           <a:effectLst/>
           <a:extLst>
             <a:ext uri="{909E8E84-426E-40dd-AFC4-6F175D3DCCD1}">
-              <a14:hiddenFill xmlns="" xmlns:a14="http://schemas.microsoft.com/office/drawing/2010/main">
+              <a14:hiddenFill xmlns:a14="http://schemas.microsoft.com/office/drawing/2010/main" xmlns="">
                 <a:solidFill>
                   <a:schemeClr val="accent1"/>
                 </a:solidFill>
               </a14:hiddenFill>
             </a:ext>
             <a:ext uri="{91240B29-F687-4f45-9708-019B960494DF}">
-              <a14:hiddenLine xmlns="" xmlns:a14="http://schemas.microsoft.com/office/drawing/2010/main" w="9525">
+              <a14:hiddenLine xmlns:a14="http://schemas.microsoft.com/office/drawing/2010/main" xmlns="" w="9525">
                 <a:solidFill>
                   <a:schemeClr val="tx1"/>
                 </a:solidFill>
@@ -2075,7 +2244,7 @@
               </a14:hiddenLine>
             </a:ext>
             <a:ext uri="{AF507438-7753-43e0-B8FC-AC1667EBCBE1}">
-              <a14:hiddenEffects xmlns="" xmlns:a14="http://schemas.microsoft.com/office/drawing/2010/main">
+              <a14:hiddenEffects xmlns:a14="http://schemas.microsoft.com/office/drawing/2010/main" xmlns="">
                 <a:effectLst>
                   <a:outerShdw dist="35921" dir="2700000" algn="ctr" rotWithShape="0">
                     <a:schemeClr val="bg2"/>
@@ -2395,19 +2564,11 @@
             </a:r>
             <a:r>
               <a:rPr lang="de-DE" dirty="0" smtClean="0"/>
-              <a:t>ist somit schon deutlich besser, als eine naive vollständige Suche, deren Komplexität in O(p − 1) liegt, aber dennoch zu stark von der Größe der zugrundeliegenden Gruppe abhängig ist. Anzumerken ist, dass dieser Algorithmus ein sogenannter generischer Algorithmus ist, womit dieser für jede Gruppe funktioniert und nicht von einer speziellen Struktur der Gruppe abhängt</a:t>
-            </a:r>
-            <a:r>
-              <a:rPr lang="de-DE" dirty="0" smtClean="0"/>
-              <a:t>. Kann</a:t>
+              <a:t>ist somit schon deutlich besser, als eine naive vollständige Suche, deren Komplexität in O(p − 1) liegt, aber dennoch zu stark von der Größe der zugrundeliegenden Gruppe abhängig ist. Anzumerken ist, dass dieser Algorithmus ein sogenannter generischer Algorithmus ist, womit dieser für jede Gruppe funktioniert und nicht von einer speziellen Struktur der Gruppe abhängt. Kann</a:t>
             </a:r>
             <a:r>
               <a:rPr lang="de-DE" baseline="0" dirty="0" smtClean="0"/>
-              <a:t> somit zum lösen des DLP und des ECDLP </a:t>
-            </a:r>
-            <a:r>
-              <a:rPr lang="de-DE" baseline="0" smtClean="0"/>
-              <a:t>genutzt werden.</a:t>
+              <a:t> somit zum lösen des DLP und des ECDLP genutzt werden.</a:t>
             </a:r>
             <a:endParaRPr lang="de-DE" dirty="0"/>
           </a:p>
@@ -2441,6 +2602,143 @@
     <p:extLst>
       <p:ext uri="{BB962C8B-B14F-4D97-AF65-F5344CB8AC3E}">
         <p14:creationId xmlns:p14="http://schemas.microsoft.com/office/powerpoint/2010/main" val="1662091121"/>
+      </p:ext>
+    </p:extLst>
+  </p:cSld>
+  <p:clrMapOvr>
+    <a:masterClrMapping/>
+  </p:clrMapOvr>
+</p:notes>
+</file>
+
+<file path=ppt/notesSlides/notesSlide11.xml><?xml version="1.0" encoding="utf-8"?>
+<p:notes xmlns:a="http://schemas.openxmlformats.org/drawingml/2006/main" xmlns:r="http://schemas.openxmlformats.org/officeDocument/2006/relationships" xmlns:p="http://schemas.openxmlformats.org/presentationml/2006/main">
+  <p:cSld>
+    <p:spTree>
+      <p:nvGrpSpPr>
+        <p:cNvPr id="1" name=""/>
+        <p:cNvGrpSpPr/>
+        <p:nvPr/>
+      </p:nvGrpSpPr>
+      <p:grpSpPr>
+        <a:xfrm>
+          <a:off x="0" y="0"/>
+          <a:ext cx="0" cy="0"/>
+          <a:chOff x="0" y="0"/>
+          <a:chExt cx="0" cy="0"/>
+        </a:xfrm>
+      </p:grpSpPr>
+      <p:sp>
+        <p:nvSpPr>
+          <p:cNvPr id="2" name="Folienbildplatzhalter 1"/>
+          <p:cNvSpPr>
+            <a:spLocks noGrp="1" noRot="1" noChangeAspect="1"/>
+          </p:cNvSpPr>
+          <p:nvPr>
+            <p:ph type="sldImg"/>
+          </p:nvPr>
+        </p:nvSpPr>
+        <p:spPr/>
+      </p:sp>
+      <p:sp>
+        <p:nvSpPr>
+          <p:cNvPr id="3" name="Notizenplatzhalter 2"/>
+          <p:cNvSpPr>
+            <a:spLocks noGrp="1"/>
+          </p:cNvSpPr>
+          <p:nvPr>
+            <p:ph type="body" idx="1"/>
+          </p:nvPr>
+        </p:nvSpPr>
+        <p:spPr/>
+        <p:txBody>
+          <a:bodyPr/>
+          <a:lstStyle/>
+          <a:p>
+            <a:pPr marL="171450" marR="0" indent="-171450" algn="l" defTabSz="914400" rtl="0" eaLnBrk="1" fontAlgn="base" latinLnBrk="0" hangingPunct="1">
+              <a:lnSpc>
+                <a:spcPct val="100000"/>
+              </a:lnSpc>
+              <a:spcBef>
+                <a:spcPct val="30000"/>
+              </a:spcBef>
+              <a:spcAft>
+                <a:spcPct val="0"/>
+              </a:spcAft>
+              <a:buClrTx/>
+              <a:buSzTx/>
+              <a:buFontTx/>
+              <a:buChar char="-"/>
+              <a:tabLst/>
+              <a:defRPr/>
+            </a:pPr>
+            <a:r>
+              <a:rPr lang="de-DE" dirty="0" smtClean="0"/>
+              <a:t>Verschlüsselung von Daten ist aus der heutigen vernetzten Welt nicht mehr wegzudenken. Aus diesem Grund sind heutige Verschlüsselungstechniken, die auf Faktorisierung von Primzahlen oder dem diskreten Logarithmus-Problem beruhen, zum Standard geworden. </a:t>
+            </a:r>
+          </a:p>
+          <a:p>
+            <a:pPr marL="171450" marR="0" indent="-171450" algn="l" defTabSz="914400" rtl="0" eaLnBrk="1" fontAlgn="base" latinLnBrk="0" hangingPunct="1">
+              <a:lnSpc>
+                <a:spcPct val="100000"/>
+              </a:lnSpc>
+              <a:spcBef>
+                <a:spcPct val="30000"/>
+              </a:spcBef>
+              <a:spcAft>
+                <a:spcPct val="0"/>
+              </a:spcAft>
+              <a:buClrTx/>
+              <a:buSzTx/>
+              <a:buFontTx/>
+              <a:buChar char="-"/>
+              <a:tabLst/>
+              <a:defRPr/>
+            </a:pPr>
+            <a:r>
+              <a:rPr lang="de-DE" dirty="0" smtClean="0"/>
+              <a:t>Bezüglich der Sicherheit von heutigen kryptographischen Verfahren muss man sich aktuell keine Sorgen machen, zumindest wenn die Mindestanforderungen bezüglich der Größe des Körpers und der Schlüssellänge eingehalten werden. Bei</a:t>
+            </a:r>
+            <a:r>
+              <a:rPr lang="de-DE" baseline="0" dirty="0" smtClean="0"/>
+              <a:t> </a:t>
+            </a:r>
+            <a:r>
+              <a:rPr lang="de-DE" dirty="0" smtClean="0"/>
+              <a:t>zu kleinen Schlüssellängen ist auch bei der besten Verschlüsselung heutzutage keine Sicherheit gegeben.</a:t>
+            </a:r>
+            <a:endParaRPr lang="de-DE" dirty="0"/>
+          </a:p>
+        </p:txBody>
+      </p:sp>
+      <p:sp>
+        <p:nvSpPr>
+          <p:cNvPr id="4" name="Foliennummernplatzhalter 3"/>
+          <p:cNvSpPr>
+            <a:spLocks noGrp="1"/>
+          </p:cNvSpPr>
+          <p:nvPr>
+            <p:ph type="sldNum" sz="quarter" idx="10"/>
+          </p:nvPr>
+        </p:nvSpPr>
+        <p:spPr/>
+        <p:txBody>
+          <a:bodyPr/>
+          <a:lstStyle/>
+          <a:p>
+            <a:fld id="{932B0C62-07EA-4146-9798-A0A17F7FEF9F}" type="slidenum">
+              <a:rPr lang="de-DE" smtClean="0"/>
+              <a:pPr/>
+              <a:t>14</a:t>
+            </a:fld>
+            <a:endParaRPr lang="de-DE" dirty="0"/>
+          </a:p>
+        </p:txBody>
+      </p:sp>
+    </p:spTree>
+    <p:extLst>
+      <p:ext uri="{BB962C8B-B14F-4D97-AF65-F5344CB8AC3E}">
+        <p14:creationId xmlns:p14="http://schemas.microsoft.com/office/powerpoint/2010/main" val="2073558370"/>
       </p:ext>
     </p:extLst>
   </p:cSld>
@@ -2500,7 +2798,19 @@
             </a:pPr>
             <a:r>
               <a:rPr lang="de-DE" noProof="0" dirty="0" smtClean="0"/>
-              <a:t>Wir besprechen hier nur die Grundlagen von elliptischen Kurven die wir für das </a:t>
+              <a:t>Zunächst einmal</a:t>
+            </a:r>
+            <a:r>
+              <a:rPr lang="de-DE" baseline="0" noProof="0" dirty="0" smtClean="0"/>
+              <a:t>, ich zeige </a:t>
+            </a:r>
+            <a:r>
+              <a:rPr lang="de-DE" noProof="0" dirty="0" smtClean="0"/>
+              <a:t>hier </a:t>
+            </a:r>
+            <a:r>
+              <a:rPr lang="de-DE" noProof="0" dirty="0" smtClean="0"/>
+              <a:t>nur die Grundlagen von elliptischen Kurven die wir für das </a:t>
             </a:r>
             <a:r>
               <a:rPr lang="de-DE" noProof="0" dirty="0" err="1" smtClean="0"/>
@@ -2568,7 +2878,15 @@
             </a:r>
             <a:r>
               <a:rPr lang="de-DE" noProof="0" dirty="0" smtClean="0"/>
-              <a:t>weitergehende Informationen muss an dieser Stelle auf die verwiesene</a:t>
+              <a:t>weitergehende Informationen </a:t>
+            </a:r>
+            <a:r>
+              <a:rPr lang="de-DE" noProof="0" dirty="0" smtClean="0"/>
+              <a:t>über elliptische Kurven muss </a:t>
+            </a:r>
+            <a:r>
+              <a:rPr lang="de-DE" noProof="0" dirty="0" smtClean="0"/>
+              <a:t>an dieser Stelle auf die verwiesene</a:t>
             </a:r>
             <a:r>
               <a:rPr lang="de-DE" baseline="0" noProof="0" dirty="0" smtClean="0"/>
@@ -2583,7 +2901,31 @@
             </a:pPr>
             <a:r>
               <a:rPr lang="de-DE" noProof="0" dirty="0" smtClean="0"/>
-              <a:t>Zur Motivation, das </a:t>
+              <a:t>Zur Motivation, </a:t>
+            </a:r>
+            <a:r>
+              <a:rPr lang="de-DE" noProof="0" dirty="0" smtClean="0"/>
+              <a:t>elliptische Kurven sollen</a:t>
+            </a:r>
+            <a:r>
+              <a:rPr lang="de-DE" baseline="0" noProof="0" dirty="0" smtClean="0"/>
+              <a:t> für </a:t>
+            </a:r>
+            <a:r>
+              <a:rPr lang="de-DE" dirty="0" smtClean="0"/>
+              <a:t>Asymmetrische Verschlüsselung eingesetzt werden</a:t>
+            </a:r>
+            <a:r>
+              <a:rPr lang="de-DE" baseline="0" dirty="0" smtClean="0"/>
+              <a:t>. D</a:t>
+            </a:r>
+            <a:r>
+              <a:rPr lang="de-DE" noProof="0" dirty="0" err="1" smtClean="0"/>
+              <a:t>as</a:t>
+            </a:r>
+            <a:r>
+              <a:rPr lang="de-DE" noProof="0" dirty="0" smtClean="0"/>
+              <a:t> </a:t>
             </a:r>
             <a:r>
               <a:rPr lang="de-DE" noProof="0" dirty="0" smtClean="0"/>
@@ -2591,11 +2933,15 @@
             </a:r>
             <a:r>
               <a:rPr lang="de-DE" baseline="0" noProof="0" dirty="0" smtClean="0"/>
-              <a:t> kann viel kürzere Schlüssellängen hervorbringen ohne das dabei die Sicherheit verringert wird. Als Beispiel ein RSA-Schlüssel mit 1024 Bit ist etwa so sicher wie ein Schlüssel aus einer elliptischen Kurve mit gerade mal ca. 160 </a:t>
+              <a:t> kann </a:t>
             </a:r>
             <a:r>
               <a:rPr lang="de-DE" baseline="0" noProof="0" dirty="0" smtClean="0"/>
-              <a:t>Bit. Warum das so ist, da kommen wir noch später dazu.</a:t>
+              <a:t>dabei viel </a:t>
+            </a:r>
+            <a:r>
+              <a:rPr lang="de-DE" baseline="0" noProof="0" dirty="0" smtClean="0"/>
+              <a:t>kürzere Schlüssellängen hervorbringen ohne das dabei die Sicherheit verringert wird. Als Beispiel ein RSA-Schlüssel mit 1024 Bit ist etwa so sicher wie ein Schlüssel aus einer elliptischen Kurve mit gerade mal ca. 160 Bit. Warum das so ist, da kommen wir noch später dazu.</a:t>
             </a:r>
           </a:p>
           <a:p>
@@ -2738,11 +3084,7 @@
             </a:pPr>
             <a:r>
               <a:rPr lang="de-DE" dirty="0" smtClean="0"/>
-              <a:t>Eine </a:t>
-            </a:r>
-            <a:r>
-              <a:rPr lang="de-DE" dirty="0" smtClean="0"/>
-              <a:t>elliptische Kurve ist eine ebene Kurve wie in Abbildung gezeigt. Sie wird durch eine Gleichung der Form: $y^2 = x^3 + </a:t>
+              <a:t>Eine elliptische Kurve ist eine ebene Kurve wie in Abbildung gezeigt. Sie wird durch eine Gleichung der Form: $y^2 = x^3 + </a:t>
             </a:r>
             <a:r>
               <a:rPr lang="de-DE" dirty="0" err="1" smtClean="0"/>
@@ -2750,15 +3092,7 @@
             </a:r>
             <a:r>
               <a:rPr lang="de-DE" dirty="0" smtClean="0"/>
-              <a:t> +b$ beschrieben. Damit ist eine </a:t>
-            </a:r>
-            <a:r>
-              <a:rPr lang="de-DE" dirty="0" smtClean="0"/>
-              <a:t>Menge </a:t>
-            </a:r>
-            <a:r>
-              <a:rPr lang="de-DE" dirty="0" smtClean="0"/>
-              <a:t>aller Punkte P(x, y), die auf der elliptischen Kurve liegen, definiert. Wichtig dabei ist, dass die Kurvenparameter a und b so gewählt sind, dass die partiellen Ableitungen nach x und nach y auf keinem Punkt der Kurve gleichzeitig null sind. </a:t>
+              <a:t> +b$ beschrieben. Damit ist eine Menge aller Punkte P(x, y), die auf der elliptischen Kurve liegen, definiert. Wichtig dabei ist, dass die Kurvenparameter a und b so gewählt sind, dass die partiellen Ableitungen nach x und nach y auf keinem Punkt der Kurve gleichzeitig null sind. </a:t>
             </a:r>
           </a:p>
           <a:p>
@@ -2768,21 +3102,8 @@
             </a:pPr>
             <a:r>
               <a:rPr lang="de-DE" dirty="0" smtClean="0"/>
-              <a:t>Anders ausgedrückt: Die Kurve darf sich nicht selbst schneiden, ansonsten kann die </a:t>
-            </a:r>
-            <a:r>
-              <a:rPr lang="de-DE" dirty="0" smtClean="0"/>
-              <a:t>Additionsoperation </a:t>
-            </a:r>
-            <a:r>
-              <a:rPr lang="de-DE" dirty="0" smtClean="0"/>
-              <a:t>nicht für beliebige Punkte durchgeführt werden</a:t>
-            </a:r>
-            <a:r>
-              <a:rPr lang="de-DE" dirty="0" smtClean="0"/>
-              <a:t>.</a:t>
-            </a:r>
-            <a:endParaRPr lang="de-DE" dirty="0" smtClean="0"/>
+              <a:t>Anders ausgedrückt: Die Kurve darf sich nicht selbst schneiden, ansonsten kann die Additionsoperation nicht für beliebige Punkte durchgeführt werden.</a:t>
+            </a:r>
           </a:p>
           <a:p>
             <a:pPr marL="171450" indent="-171450">
@@ -2799,35 +3120,15 @@
             </a:r>
             <a:r>
               <a:rPr lang="de-DE" dirty="0" smtClean="0"/>
-              <a:t>Mit Addition ist das Verknüpfen von zwei Punkten gemeint. Man könnte es auch als Multiplikation bezeichnen. In beiden Fällen hat es </a:t>
+              <a:t>Mit Addition ist das Verknüpfen von zwei Punkten gemeint. Man könnte es auch als Multiplikation bezeichnen. In beiden Fällen hat es allerdings nichts mit den bekannten Operationen auf Zahlen zu tun. </a:t>
+            </a:r>
+            <a:r>
+              <a:rPr lang="de-DE" baseline="0" dirty="0" smtClean="0"/>
+              <a:t>Das Verknüpfen von zwei Punkten auf einer elliptischen Kurve ist vielmehr geometrisch definiert.</a:t>
             </a:r>
             <a:r>
               <a:rPr lang="de-DE" dirty="0" smtClean="0"/>
-              <a:t>allerdings nichts </a:t>
-            </a:r>
-            <a:r>
-              <a:rPr lang="de-DE" dirty="0" smtClean="0"/>
-              <a:t>mit den bekannten Operationen auf Zahlen zu tun. </a:t>
-            </a:r>
-            <a:r>
-              <a:rPr lang="de-DE" baseline="0" dirty="0" smtClean="0"/>
-              <a:t>Das Verknüpfen von zwei Punkten auf einer elliptischen Kurve ist </a:t>
-            </a:r>
-            <a:r>
-              <a:rPr lang="de-DE" baseline="0" dirty="0" smtClean="0"/>
-              <a:t>vielmehr geometrisch </a:t>
-            </a:r>
-            <a:r>
-              <a:rPr lang="de-DE" baseline="0" dirty="0" smtClean="0"/>
-              <a:t>definiert.</a:t>
-            </a:r>
-            <a:r>
-              <a:rPr lang="de-DE" dirty="0" smtClean="0"/>
-              <a:t> Es ergibt sich wieder einen Punkt, welcher ebenfalls auf der Kurve liegt</a:t>
-            </a:r>
-            <a:r>
-              <a:rPr lang="de-DE" dirty="0" smtClean="0"/>
-              <a:t>.</a:t>
+              <a:t> Es ergibt sich wieder einen Punkt, welcher ebenfalls auf der Kurve liegt.</a:t>
             </a:r>
           </a:p>
           <a:p>
@@ -2979,23 +3280,7 @@
             </a:r>
             <a:r>
               <a:rPr lang="de-DE" dirty="0" smtClean="0"/>
-              <a:t> </a:t>
-            </a:r>
-            <a:r>
-              <a:rPr lang="de-DE" dirty="0" smtClean="0"/>
-              <a:t>= </a:t>
-            </a:r>
-            <a:r>
-              <a:rPr lang="de-DE" dirty="0" smtClean="0"/>
-              <a:t>PX) </a:t>
-            </a:r>
-            <a:r>
-              <a:rPr lang="de-DE" dirty="0" smtClean="0"/>
-              <a:t>gilt, entsteht eine vertikale Gerade und die Kurve wird kein weiteres </a:t>
-            </a:r>
-            <a:r>
-              <a:rPr lang="de-DE" dirty="0" smtClean="0"/>
-              <a:t>mal</a:t>
+              <a:t> = PX) gilt, entsteht eine vertikale Gerade und die Kurve wird kein weiteres mal</a:t>
             </a:r>
             <a:r>
               <a:rPr lang="de-DE" baseline="0" dirty="0" smtClean="0"/>
@@ -3003,11 +3288,7 @@
             </a:r>
             <a:r>
               <a:rPr lang="de-DE" dirty="0" smtClean="0"/>
-              <a:t>geschnitten</a:t>
-            </a:r>
-            <a:r>
-              <a:rPr lang="de-DE" dirty="0" smtClean="0"/>
-              <a:t>. Für diesen Fall wird die elliptische Kurve um einen weiteren Punkt welcher im Unendlichen liegt, ergänzt. Die Addition von Punk P mit dem</a:t>
+              <a:t>geschnitten. Für diesen Fall wird die elliptische Kurve um einen weiteren Punkt welcher im Unendlichen liegt, ergänzt. Die Addition von Punk P mit dem</a:t>
             </a:r>
             <a:r>
               <a:rPr lang="de-DE" baseline="0" dirty="0" smtClean="0"/>
@@ -3368,11 +3649,7 @@
             </a:r>
             <a:r>
               <a:rPr lang="de-DE" dirty="0" smtClean="0"/>
-              <a:t>Der </a:t>
-            </a:r>
-            <a:r>
-              <a:rPr lang="de-DE" dirty="0" smtClean="0"/>
-              <a:t>Grund für diese drastische Verkürzung der Schlüssellängen liegt in den grundlegenden Prinzipien der Algorithmen.</a:t>
+              <a:t>Der Grund für diese drastische Verkürzung der Schlüssellängen liegt in den grundlegenden Prinzipien der Algorithmen.</a:t>
             </a:r>
             <a:br>
               <a:rPr lang="de-DE" dirty="0" smtClean="0"/>
@@ -3476,29 +3753,8 @@
             </a:r>
             <a:r>
               <a:rPr lang="de-DE" baseline="0" dirty="0" smtClean="0"/>
-              <a:t>r wollen zu </a:t>
-            </a:r>
-            <a:r>
-              <a:rPr lang="de-DE" baseline="0" dirty="0" smtClean="0"/>
-              <a:t>einer </a:t>
-            </a:r>
-            <a:r>
-              <a:rPr lang="de-DE" baseline="0" dirty="0" smtClean="0"/>
-              <a:t>gegebener Basis </a:t>
-            </a:r>
-            <a:r>
-              <a:rPr lang="de-DE" baseline="0" dirty="0" smtClean="0"/>
-              <a:t>g, einem gegebenen p </a:t>
-            </a:r>
-            <a:r>
-              <a:rPr lang="de-DE" baseline="0" dirty="0" smtClean="0"/>
-              <a:t>sowie y den Exponenten x ermitteln. An das x, wie in den Grundlagen siehe Handout gezeigt kommt man mit der Logarithmus Funktion nicht ran, da wir uns hier ja in einem Körper befinden. Jetzt muss man sich Grundsätzlich Fragen was ist das x, wie setzt es sich zusammen</a:t>
-            </a:r>
-            <a:r>
-              <a:rPr lang="de-DE" baseline="0" dirty="0" smtClean="0"/>
-              <a:t>?</a:t>
-            </a:r>
-            <a:endParaRPr lang="de-DE" baseline="0" dirty="0" smtClean="0"/>
+              <a:t>r wollen zu einer gegebener Basis g, einem gegebenen p sowie y den Exponenten x ermitteln. An das x, wie in den Grundlagen siehe Handout gezeigt kommt man mit der Logarithmus Funktion nicht ran, da wir uns hier ja in einem Körper befinden. Jetzt muss man sich Grundsätzlich Fragen was ist das x, wie setzt es sich zusammen?</a:t>
+            </a:r>
           </a:p>
           <a:p>
             <a:pPr marL="171450" indent="-171450">
@@ -3507,7 +3763,15 @@
             </a:pPr>
             <a:r>
               <a:rPr lang="de-DE" baseline="0" dirty="0" smtClean="0"/>
-              <a:t>Wir wählen also als erstes eine Zahl t Element aus N, dann lässt sich der diskrete Logarithmus von y schreiben als …[</a:t>
+              <a:t>Wir </a:t>
+            </a:r>
+            <a:r>
+              <a:rPr lang="de-DE" baseline="0" dirty="0" smtClean="0"/>
+              <a:t>wählen als </a:t>
+            </a:r>
+            <a:r>
+              <a:rPr lang="de-DE" baseline="0" dirty="0" smtClean="0"/>
+              <a:t>erstes eine Zahl t Element aus N, dann lässt sich der diskrete Logarithmus von y schreiben als …[</a:t>
             </a:r>
             <a:r>
               <a:rPr lang="de-DE" dirty="0" smtClean="0"/>
@@ -3525,19 +3789,15 @@
             </a:pPr>
             <a:r>
               <a:rPr lang="de-DE" baseline="0" dirty="0" smtClean="0"/>
-              <a:t>Diese beiden Formeln lassen sich </a:t>
+              <a:t>Diese beiden Formeln lassen sich durch Einsetzung und Umformung so verändern das r und q jeweils auf der Anderen Seite stehen. Was bringt uns das nun? Wir haben fast </a:t>
             </a:r>
             <a:r>
               <a:rPr lang="de-DE" baseline="0" dirty="0" smtClean="0"/>
-              <a:t>durch </a:t>
+              <a:t>alle Variablen </a:t>
             </a:r>
             <a:r>
               <a:rPr lang="de-DE" baseline="0" dirty="0" smtClean="0"/>
-              <a:t>Einsetzung und Umformung so verändern das r und q jeweils auf der Anderen Seite stehen. Was bringt uns das nun? Wir haben fast alles gegeben. Wenn wir nun ein r und ein q finden so das diese Gleichung stimmt Dann haben wir genau das r und q gefunden womit wir den diskreten-Logarithmus mit der Formel </a:t>
-            </a:r>
-            <a:r>
-              <a:rPr lang="de-DE" baseline="0" dirty="0" smtClean="0"/>
-              <a:t>des d</a:t>
+              <a:t>gegeben. Wenn wir nun ein r und ein q finden so das diese Gleichung stimmt Dann haben wir genau das r und q gefunden womit wir den diskreten-Logarithmus mit der Formel des d</a:t>
             </a:r>
             <a:r>
               <a:rPr lang="de-DE" sz="1200" dirty="0" smtClean="0"/>
@@ -3545,15 +3805,7 @@
             </a:r>
             <a:r>
               <a:rPr lang="de-DE" baseline="0" dirty="0" smtClean="0"/>
-              <a:t> </a:t>
-            </a:r>
-            <a:r>
-              <a:rPr lang="de-DE" baseline="0" dirty="0" smtClean="0"/>
-              <a:t>recht simpel errechnen können</a:t>
-            </a:r>
-            <a:r>
-              <a:rPr lang="de-DE" baseline="0" dirty="0" smtClean="0"/>
-              <a:t>.</a:t>
+              <a:t> recht simpel errechnen können.</a:t>
             </a:r>
           </a:p>
           <a:p>
@@ -5556,14 +5808,14 @@
           <a:effectLst/>
           <a:extLst>
             <a:ext uri="{909E8E84-426E-40dd-AFC4-6F175D3DCCD1}">
-              <a14:hiddenFill xmlns="" xmlns:a14="http://schemas.microsoft.com/office/drawing/2010/main">
+              <a14:hiddenFill xmlns:a14="http://schemas.microsoft.com/office/drawing/2010/main" xmlns="">
                 <a:solidFill>
                   <a:schemeClr val="accent1"/>
                 </a:solidFill>
               </a14:hiddenFill>
             </a:ext>
             <a:ext uri="{91240B29-F687-4f45-9708-019B960494DF}">
-              <a14:hiddenLine xmlns="" xmlns:a14="http://schemas.microsoft.com/office/drawing/2010/main" w="9525">
+              <a14:hiddenLine xmlns:a14="http://schemas.microsoft.com/office/drawing/2010/main" xmlns="" w="9525">
                 <a:solidFill>
                   <a:schemeClr val="tx1"/>
                 </a:solidFill>
@@ -5573,7 +5825,7 @@
               </a14:hiddenLine>
             </a:ext>
             <a:ext uri="{AF507438-7753-43e0-B8FC-AC1667EBCBE1}">
-              <a14:hiddenEffects xmlns="" xmlns:a14="http://schemas.microsoft.com/office/drawing/2010/main">
+              <a14:hiddenEffects xmlns:a14="http://schemas.microsoft.com/office/drawing/2010/main" xmlns="">
                 <a:effectLst>
                   <a:outerShdw dist="35921" dir="2700000" algn="ctr" rotWithShape="0">
                     <a:schemeClr val="bg2"/>
@@ -5624,14 +5876,14 @@
           <a:effectLst/>
           <a:extLst>
             <a:ext uri="{909E8E84-426E-40dd-AFC4-6F175D3DCCD1}">
-              <a14:hiddenFill xmlns="" xmlns:a14="http://schemas.microsoft.com/office/drawing/2010/main">
+              <a14:hiddenFill xmlns:a14="http://schemas.microsoft.com/office/drawing/2010/main" xmlns="">
                 <a:solidFill>
                   <a:schemeClr val="accent1"/>
                 </a:solidFill>
               </a14:hiddenFill>
             </a:ext>
             <a:ext uri="{91240B29-F687-4f45-9708-019B960494DF}">
-              <a14:hiddenLine xmlns="" xmlns:a14="http://schemas.microsoft.com/office/drawing/2010/main" w="9525">
+              <a14:hiddenLine xmlns:a14="http://schemas.microsoft.com/office/drawing/2010/main" xmlns="" w="9525">
                 <a:solidFill>
                   <a:schemeClr val="tx1"/>
                 </a:solidFill>
@@ -5641,7 +5893,7 @@
               </a14:hiddenLine>
             </a:ext>
             <a:ext uri="{AF507438-7753-43e0-B8FC-AC1667EBCBE1}">
-              <a14:hiddenEffects xmlns="" xmlns:a14="http://schemas.microsoft.com/office/drawing/2010/main">
+              <a14:hiddenEffects xmlns:a14="http://schemas.microsoft.com/office/drawing/2010/main" xmlns="">
                 <a:effectLst>
                   <a:outerShdw dist="35921" dir="2700000" algn="ctr" rotWithShape="0">
                     <a:schemeClr val="bg2"/>
@@ -5720,14 +5972,14 @@
           <a:effectLst/>
           <a:extLst>
             <a:ext uri="{909E8E84-426E-40dd-AFC4-6F175D3DCCD1}">
-              <a14:hiddenFill xmlns="" xmlns:a14="http://schemas.microsoft.com/office/drawing/2010/main">
+              <a14:hiddenFill xmlns:a14="http://schemas.microsoft.com/office/drawing/2010/main" xmlns="">
                 <a:solidFill>
                   <a:schemeClr val="accent1"/>
                 </a:solidFill>
               </a14:hiddenFill>
             </a:ext>
             <a:ext uri="{91240B29-F687-4f45-9708-019B960494DF}">
-              <a14:hiddenLine xmlns="" xmlns:a14="http://schemas.microsoft.com/office/drawing/2010/main" w="9525">
+              <a14:hiddenLine xmlns:a14="http://schemas.microsoft.com/office/drawing/2010/main" xmlns="" w="9525">
                 <a:solidFill>
                   <a:schemeClr val="tx1"/>
                 </a:solidFill>
@@ -5737,7 +5989,7 @@
               </a14:hiddenLine>
             </a:ext>
             <a:ext uri="{AF507438-7753-43e0-B8FC-AC1667EBCBE1}">
-              <a14:hiddenEffects xmlns="" xmlns:a14="http://schemas.microsoft.com/office/drawing/2010/main">
+              <a14:hiddenEffects xmlns:a14="http://schemas.microsoft.com/office/drawing/2010/main" xmlns="">
                 <a:effectLst>
                   <a:outerShdw dist="35921" dir="2700000" algn="ctr" rotWithShape="0">
                     <a:schemeClr val="bg2"/>
@@ -5799,14 +6051,14 @@
           <a:effectLst/>
           <a:extLst>
             <a:ext uri="{909E8E84-426E-40dd-AFC4-6F175D3DCCD1}">
-              <a14:hiddenFill xmlns="" xmlns:a14="http://schemas.microsoft.com/office/drawing/2010/main">
+              <a14:hiddenFill xmlns:a14="http://schemas.microsoft.com/office/drawing/2010/main" xmlns="">
                 <a:solidFill>
                   <a:schemeClr val="accent1"/>
                 </a:solidFill>
               </a14:hiddenFill>
             </a:ext>
             <a:ext uri="{91240B29-F687-4f45-9708-019B960494DF}">
-              <a14:hiddenLine xmlns="" xmlns:a14="http://schemas.microsoft.com/office/drawing/2010/main" w="9525" algn="ctr">
+              <a14:hiddenLine xmlns:a14="http://schemas.microsoft.com/office/drawing/2010/main" xmlns="" w="9525" algn="ctr">
                 <a:solidFill>
                   <a:schemeClr val="tx1"/>
                 </a:solidFill>
@@ -5816,7 +6068,7 @@
               </a14:hiddenLine>
             </a:ext>
             <a:ext uri="{AF507438-7753-43e0-B8FC-AC1667EBCBE1}">
-              <a14:hiddenEffects xmlns="" xmlns:a14="http://schemas.microsoft.com/office/drawing/2010/main">
+              <a14:hiddenEffects xmlns:a14="http://schemas.microsoft.com/office/drawing/2010/main" xmlns="">
                 <a:effectLst>
                   <a:outerShdw dist="35921" dir="2700000" algn="ctr" rotWithShape="0">
                     <a:schemeClr val="bg2"/>
@@ -5987,12 +6239,12 @@
           <a:effectLst/>
           <a:extLst>
             <a:ext uri="{909E8E84-426E-40dd-AFC4-6F175D3DCCD1}">
-              <a14:hiddenFill xmlns="" xmlns:a14="http://schemas.microsoft.com/office/drawing/2010/main">
+              <a14:hiddenFill xmlns:a14="http://schemas.microsoft.com/office/drawing/2010/main" xmlns="">
                 <a:noFill/>
               </a14:hiddenFill>
             </a:ext>
             <a:ext uri="{AF507438-7753-43e0-B8FC-AC1667EBCBE1}">
-              <a14:hiddenEffects xmlns="" xmlns:a14="http://schemas.microsoft.com/office/drawing/2010/main">
+              <a14:hiddenEffects xmlns:a14="http://schemas.microsoft.com/office/drawing/2010/main" xmlns="">
                 <a:effectLst>
                   <a:outerShdw dist="35921" dir="2700000" algn="ctr" rotWithShape="0">
                     <a:schemeClr val="bg2"/>
@@ -6538,14 +6790,14 @@
           <a:effectLst/>
           <a:extLst>
             <a:ext uri="{909E8E84-426E-40dd-AFC4-6F175D3DCCD1}">
-              <a14:hiddenFill xmlns="" xmlns:a14="http://schemas.microsoft.com/office/drawing/2010/main">
+              <a14:hiddenFill xmlns:a14="http://schemas.microsoft.com/office/drawing/2010/main" xmlns="">
                 <a:solidFill>
                   <a:schemeClr val="accent1"/>
                 </a:solidFill>
               </a14:hiddenFill>
             </a:ext>
             <a:ext uri="{91240B29-F687-4f45-9708-019B960494DF}">
-              <a14:hiddenLine xmlns="" xmlns:a14="http://schemas.microsoft.com/office/drawing/2010/main" w="9525" algn="ctr">
+              <a14:hiddenLine xmlns:a14="http://schemas.microsoft.com/office/drawing/2010/main" xmlns="" w="9525" algn="ctr">
                 <a:solidFill>
                   <a:schemeClr val="tx1"/>
                 </a:solidFill>
@@ -6555,7 +6807,7 @@
               </a14:hiddenLine>
             </a:ext>
             <a:ext uri="{AF507438-7753-43e0-B8FC-AC1667EBCBE1}">
-              <a14:hiddenEffects xmlns="" xmlns:a14="http://schemas.microsoft.com/office/drawing/2010/main">
+              <a14:hiddenEffects xmlns:a14="http://schemas.microsoft.com/office/drawing/2010/main" xmlns="">
                 <a:effectLst>
                   <a:outerShdw dist="35921" dir="2700000" algn="ctr" rotWithShape="0">
                     <a:schemeClr val="bg2"/>
@@ -6953,8 +7205,8 @@
           </a:p>
         </p:txBody>
       </p:sp>
-      <mc:AlternateContent xmlns:mc="http://schemas.openxmlformats.org/markup-compatibility/2006">
-        <mc:Choice xmlns:a14="http://schemas.microsoft.com/office/drawing/2010/main" Requires="a14">
+      <mc:AlternateContent xmlns:mc="http://schemas.openxmlformats.org/markup-compatibility/2006" xmlns:a14="http://schemas.microsoft.com/office/drawing/2010/main">
+        <mc:Choice Requires="a14">
           <p:sp>
             <p:nvSpPr>
               <p:cNvPr id="9219" name="Rectangle 3"/>
@@ -7106,11 +7358,7 @@
                 </a14:m>
                 <a:r>
                   <a:rPr lang="de-DE" sz="2000" dirty="0" smtClean="0"/>
-                  <a:t>      </a:t>
-                </a:r>
-                <a:r>
-                  <a:rPr lang="de-DE" sz="2000" dirty="0" smtClean="0"/>
-                  <a:t>(  </a:t>
+                  <a:t>      (  </a:t>
                 </a:r>
                 <a14:m>
                   <m:oMath xmlns:m="http://schemas.openxmlformats.org/officeDocument/2006/math">
@@ -7421,7 +7669,7 @@
             </p:txBody>
           </p:sp>
         </mc:Choice>
-        <mc:Fallback>
+        <mc:Fallback xmlns="">
           <p:sp>
             <p:nvSpPr>
               <p:cNvPr id="9219" name="Rectangle 3"/>
@@ -7570,8 +7818,8 @@
           </a:p>
         </p:txBody>
       </p:sp>
-      <mc:AlternateContent xmlns:mc="http://schemas.openxmlformats.org/markup-compatibility/2006">
-        <mc:Choice xmlns:a14="http://schemas.microsoft.com/office/drawing/2010/main" Requires="a14">
+      <mc:AlternateContent xmlns:mc="http://schemas.openxmlformats.org/markup-compatibility/2006" xmlns:a14="http://schemas.microsoft.com/office/drawing/2010/main">
+        <mc:Choice Requires="a14">
           <p:sp>
             <p:nvSpPr>
               <p:cNvPr id="9219" name="Rectangle 3"/>
@@ -8154,13 +8402,12 @@
                 </a:r>
               </a:p>
               <a:p>
-                <a:pPr/>
                 <a:endParaRPr lang="en-US" sz="2000" dirty="0"/>
               </a:p>
             </p:txBody>
           </p:sp>
         </mc:Choice>
-        <mc:Fallback>
+        <mc:Fallback xmlns="">
           <p:sp>
             <p:nvSpPr>
               <p:cNvPr id="9219" name="Rectangle 3"/>
@@ -8634,15 +8881,16 @@
           <a:p>
             <a:r>
               <a:rPr lang="de-DE" dirty="0"/>
-              <a:t>Textfolie</a:t>
+              <a:t/>
             </a:r>
             <a:br>
               <a:rPr lang="de-DE" dirty="0"/>
             </a:br>
             <a:r>
-              <a:rPr lang="de-DE" sz="2400" b="0" i="1" dirty="0"/>
-              <a:t>Hier steht die Subheadline</a:t>
-            </a:r>
+              <a:rPr lang="de-DE" sz="2400" b="0" i="1" dirty="0" smtClean="0"/>
+              <a:t>Fazit</a:t>
+            </a:r>
+            <a:endParaRPr lang="de-DE" sz="2400" b="0" i="1" dirty="0"/>
           </a:p>
         </p:txBody>
       </p:sp>
@@ -8657,259 +8905,65 @@
           </p:nvPr>
         </p:nvSpPr>
         <p:spPr>
+          <a:xfrm>
+            <a:off x="512128" y="2138363"/>
+            <a:ext cx="8856860" cy="4522787"/>
+          </a:xfrm>
           <a:noFill/>
         </p:spPr>
         <p:txBody>
           <a:bodyPr/>
           <a:lstStyle/>
           <a:p>
-            <a:r>
-              <a:rPr lang="en-US" dirty="0" err="1"/>
-              <a:t>Fließtext</a:t>
-            </a:r>
-            <a:r>
-              <a:rPr lang="en-US" dirty="0"/>
-              <a:t> </a:t>
-            </a:r>
-            <a:r>
-              <a:rPr lang="en-US" dirty="0" err="1"/>
-              <a:t>ohne</a:t>
-            </a:r>
-            <a:r>
-              <a:rPr lang="en-US" dirty="0"/>
-              <a:t> </a:t>
-            </a:r>
-            <a:r>
-              <a:rPr lang="en-US" dirty="0" err="1"/>
-              <a:t>Aufzählung</a:t>
-            </a:r>
-            <a:r>
-              <a:rPr lang="en-US" dirty="0"/>
-              <a:t> und </a:t>
-            </a:r>
-            <a:r>
-              <a:rPr lang="en-US" dirty="0" err="1"/>
-              <a:t>Einrückung</a:t>
-            </a:r>
-            <a:r>
-              <a:rPr lang="en-US" dirty="0"/>
-              <a:t>. </a:t>
-            </a:r>
-            <a:r>
-              <a:rPr lang="en-US" b="1" dirty="0" err="1"/>
-              <a:t>Hervorhebung</a:t>
-            </a:r>
-            <a:r>
-              <a:rPr lang="en-US" dirty="0"/>
-              <a:t> </a:t>
-            </a:r>
-            <a:r>
-              <a:rPr lang="en-US" dirty="0" err="1"/>
-              <a:t>ist</a:t>
-            </a:r>
-            <a:r>
-              <a:rPr lang="en-US" dirty="0"/>
-              <a:t> in </a:t>
-            </a:r>
-            <a:r>
-              <a:rPr lang="en-US" dirty="0" err="1"/>
-              <a:t>allen</a:t>
-            </a:r>
-            <a:r>
-              <a:rPr lang="en-US" dirty="0"/>
-              <a:t> </a:t>
-            </a:r>
-            <a:r>
-              <a:rPr lang="en-US" dirty="0" err="1"/>
-              <a:t>Ebenen</a:t>
-            </a:r>
-            <a:r>
-              <a:rPr lang="en-US" dirty="0"/>
-              <a:t> </a:t>
-            </a:r>
-            <a:r>
-              <a:rPr lang="en-US" dirty="0" err="1"/>
-              <a:t>fett</a:t>
-            </a:r>
-            <a:r>
-              <a:rPr lang="en-US" dirty="0"/>
-              <a:t>.</a:t>
-            </a:r>
-          </a:p>
-          <a:p>
-            <a:pPr lvl="1"/>
-            <a:r>
-              <a:rPr lang="en-US" dirty="0" err="1"/>
-              <a:t>Zweite</a:t>
-            </a:r>
-            <a:r>
-              <a:rPr lang="en-US" dirty="0"/>
-              <a:t> </a:t>
-            </a:r>
-            <a:r>
-              <a:rPr lang="en-US" dirty="0" err="1"/>
-              <a:t>Ebene</a:t>
-            </a:r>
-            <a:r>
-              <a:rPr lang="en-US" dirty="0"/>
-              <a:t> </a:t>
-            </a:r>
-            <a:r>
-              <a:rPr lang="en-US" dirty="0" err="1"/>
-              <a:t>mit</a:t>
-            </a:r>
-            <a:r>
-              <a:rPr lang="en-US" dirty="0"/>
-              <a:t> </a:t>
-            </a:r>
-            <a:r>
-              <a:rPr lang="en-US" dirty="0" err="1"/>
-              <a:t>Einrückung</a:t>
-            </a:r>
-            <a:r>
-              <a:rPr lang="en-US" dirty="0"/>
-              <a:t> und </a:t>
-            </a:r>
-            <a:r>
-              <a:rPr lang="en-US" dirty="0" err="1"/>
-              <a:t>Aufzählungszeichen</a:t>
-            </a:r>
-            <a:endParaRPr lang="en-US" dirty="0"/>
-          </a:p>
-          <a:p>
-            <a:pPr lvl="2"/>
-            <a:r>
-              <a:rPr lang="en-US" dirty="0" err="1"/>
-              <a:t>Dritte</a:t>
-            </a:r>
-            <a:r>
-              <a:rPr lang="en-US" dirty="0"/>
-              <a:t> </a:t>
-            </a:r>
-            <a:r>
-              <a:rPr lang="en-US" dirty="0" err="1"/>
-              <a:t>Ebene</a:t>
-            </a:r>
-            <a:r>
-              <a:rPr lang="en-US" dirty="0"/>
-              <a:t> </a:t>
-            </a:r>
-            <a:r>
-              <a:rPr lang="en-US" dirty="0" err="1"/>
-              <a:t>mit</a:t>
-            </a:r>
-            <a:r>
-              <a:rPr lang="en-US" dirty="0"/>
-              <a:t> </a:t>
-            </a:r>
-            <a:r>
-              <a:rPr lang="en-US" dirty="0" err="1"/>
-              <a:t>Einrückung</a:t>
-            </a:r>
-            <a:r>
-              <a:rPr lang="en-US" dirty="0"/>
-              <a:t> und </a:t>
-            </a:r>
-            <a:r>
-              <a:rPr lang="en-US" dirty="0" err="1"/>
-              <a:t>Aufzählungszeichen</a:t>
-            </a:r>
-            <a:endParaRPr lang="en-US" dirty="0"/>
-          </a:p>
-          <a:p>
-            <a:pPr lvl="3"/>
-            <a:r>
-              <a:rPr lang="en-US" dirty="0" err="1"/>
-              <a:t>Vierte</a:t>
-            </a:r>
-            <a:r>
-              <a:rPr lang="en-US" dirty="0"/>
-              <a:t> </a:t>
-            </a:r>
-            <a:r>
-              <a:rPr lang="en-US" dirty="0" err="1"/>
-              <a:t>Ebene</a:t>
-            </a:r>
-            <a:r>
-              <a:rPr lang="en-US" dirty="0"/>
-              <a:t> </a:t>
-            </a:r>
-            <a:r>
-              <a:rPr lang="en-US" dirty="0" err="1"/>
-              <a:t>kursiv</a:t>
-            </a:r>
-            <a:r>
-              <a:rPr lang="en-US" dirty="0"/>
-              <a:t> </a:t>
-            </a:r>
-            <a:r>
-              <a:rPr lang="en-US" dirty="0" err="1"/>
-              <a:t>mit</a:t>
-            </a:r>
-            <a:r>
-              <a:rPr lang="en-US" dirty="0"/>
-              <a:t> </a:t>
-            </a:r>
-            <a:r>
-              <a:rPr lang="en-US" dirty="0" err="1"/>
-              <a:t>Einrückung</a:t>
-            </a:r>
-            <a:r>
-              <a:rPr lang="en-US" dirty="0"/>
-              <a:t> und </a:t>
-            </a:r>
-            <a:r>
-              <a:rPr lang="en-US" dirty="0" err="1"/>
-              <a:t>Aufzählungszeichen</a:t>
-            </a:r>
-            <a:endParaRPr lang="en-US" dirty="0"/>
-          </a:p>
-          <a:p>
-            <a:pPr lvl="4"/>
-            <a:r>
-              <a:rPr lang="en-US" dirty="0" err="1"/>
-              <a:t>Fünfte</a:t>
-            </a:r>
-            <a:r>
-              <a:rPr lang="en-US" dirty="0"/>
-              <a:t> </a:t>
-            </a:r>
-            <a:r>
-              <a:rPr lang="en-US" dirty="0" err="1"/>
-              <a:t>Ebene</a:t>
-            </a:r>
-            <a:r>
-              <a:rPr lang="en-US" dirty="0"/>
-              <a:t> </a:t>
-            </a:r>
-            <a:r>
-              <a:rPr lang="en-US" dirty="0" err="1"/>
-              <a:t>mit</a:t>
-            </a:r>
-            <a:r>
-              <a:rPr lang="en-US" dirty="0"/>
-              <a:t> </a:t>
-            </a:r>
-            <a:r>
-              <a:rPr lang="en-US" dirty="0" err="1"/>
-              <a:t>Einrückung</a:t>
-            </a:r>
-            <a:r>
-              <a:rPr lang="en-US" dirty="0"/>
-              <a:t> und </a:t>
-            </a:r>
-            <a:r>
-              <a:rPr lang="en-US" dirty="0" err="1"/>
-              <a:t>Aufzählungszeichen</a:t>
-            </a:r>
-            <a:endParaRPr lang="en-US" dirty="0"/>
+            <a:pPr marL="285750" indent="-285750">
+              <a:buFont typeface="Arial" panose="020B0604020202020204" pitchFamily="34" charset="0"/>
+              <a:buChar char="•"/>
+            </a:pPr>
+            <a:r>
+              <a:rPr lang="de-DE" sz="2000" dirty="0" smtClean="0"/>
+              <a:t>Heutige</a:t>
+            </a:r>
+            <a:r>
+              <a:rPr lang="de-DE" sz="2000" dirty="0"/>
+              <a:t> Verschlüsselungstechniken </a:t>
+            </a:r>
+            <a:r>
+              <a:rPr lang="de-DE" sz="2000" dirty="0" smtClean="0"/>
+              <a:t>basieren auf Faktorisierung von Primzahlen oder dem DL-Problem</a:t>
+            </a:r>
+          </a:p>
+          <a:p>
+            <a:pPr marL="285750" indent="-285750">
+              <a:buFont typeface="Arial" panose="020B0604020202020204" pitchFamily="34" charset="0"/>
+              <a:buChar char="•"/>
+            </a:pPr>
+            <a:endParaRPr lang="de-DE" sz="2000" dirty="0" smtClean="0"/>
+          </a:p>
+          <a:p>
+            <a:pPr marL="285750" indent="-285750">
+              <a:buFont typeface="Arial" panose="020B0604020202020204" pitchFamily="34" charset="0"/>
+              <a:buChar char="•"/>
+            </a:pPr>
+            <a:r>
+              <a:rPr lang="de-DE" sz="2000" dirty="0" smtClean="0"/>
+              <a:t>Heutigen </a:t>
+            </a:r>
+            <a:r>
+              <a:rPr lang="de-DE" sz="2000" dirty="0"/>
+              <a:t>kryptographischen </a:t>
+            </a:r>
+            <a:r>
+              <a:rPr lang="de-DE" sz="2000" dirty="0" smtClean="0"/>
+              <a:t>Verfahren sind vom Grundsatz sicher, wenn die Mindestanforderungen eingehalten werden</a:t>
+            </a:r>
+            <a:endParaRPr lang="de-DE" sz="2000" dirty="0"/>
           </a:p>
         </p:txBody>
       </p:sp>
     </p:spTree>
     <p:extLst>
       <p:ext uri="{BB962C8B-B14F-4D97-AF65-F5344CB8AC3E}">
-        <p14:creationId xmlns:p14="http://schemas.microsoft.com/office/powerpoint/2010/main" val="2104484652"/>
+        <p14:creationId xmlns:p14="http://schemas.microsoft.com/office/powerpoint/2010/main" val="3756122342"/>
       </p:ext>
     </p:extLst>
   </p:cSld>
@@ -8945,7 +8999,7 @@
       </p:grpSpPr>
       <p:sp>
         <p:nvSpPr>
-          <p:cNvPr id="5" name="Foliennummernplatzhalter 4"/>
+          <p:cNvPr id="4" name="Foliennummernplatzhalter 3"/>
           <p:cNvSpPr>
             <a:spLocks noGrp="1"/>
           </p:cNvSpPr>
@@ -8959,21 +9013,21 @@
           <a:lstStyle/>
           <a:p>
             <a:r>
-              <a:rPr lang="de-DE"/>
+              <a:rPr lang="de-DE" dirty="0"/>
               <a:t>Seite </a:t>
             </a:r>
-            <a:fld id="{CAEED438-B660-4C04-BC25-4C23CCFBC7F4}" type="slidenum">
+            <a:fld id="{4CDCE16C-BB8B-41B6-BC70-61DAD202005A}" type="slidenum">
               <a:rPr lang="de-DE"/>
               <a:pPr/>
               <a:t>15</a:t>
             </a:fld>
-            <a:endParaRPr lang="de-DE"/>
+            <a:endParaRPr lang="de-DE" dirty="0"/>
           </a:p>
         </p:txBody>
       </p:sp>
       <p:sp>
         <p:nvSpPr>
-          <p:cNvPr id="14340" name="Rectangle 4"/>
+          <p:cNvPr id="9218" name="Rectangle 2"/>
           <p:cNvSpPr>
             <a:spLocks noGrp="1" noChangeArrowheads="1"/>
           </p:cNvSpPr>
@@ -8987,63 +9041,296 @@
           <a:lstStyle/>
           <a:p>
             <a:r>
-              <a:rPr lang="en-US"/>
-              <a:t>Textfolie zweispaltig</a:t>
+              <a:rPr lang="de-DE" dirty="0"/>
+              <a:t>Textfolie</a:t>
             </a:r>
             <a:br>
-              <a:rPr lang="en-US"/>
+              <a:rPr lang="de-DE" dirty="0"/>
             </a:br>
             <a:r>
-              <a:rPr lang="de-DE" sz="2400" b="0" i="1"/>
+              <a:rPr lang="de-DE" sz="2400" b="0" i="1" dirty="0"/>
               <a:t>Hier steht die Subheadline</a:t>
             </a:r>
-            <a:endParaRPr lang="en-US" sz="2400" b="0" i="1"/>
           </a:p>
         </p:txBody>
       </p:sp>
       <p:sp>
         <p:nvSpPr>
-          <p:cNvPr id="14341" name="Rectangle 5"/>
+          <p:cNvPr id="9219" name="Rectangle 3"/>
           <p:cNvSpPr>
             <a:spLocks noGrp="1" noChangeArrowheads="1"/>
           </p:cNvSpPr>
           <p:nvPr>
-            <p:ph type="body" sz="half" idx="1"/>
+            <p:ph type="body" idx="1"/>
           </p:nvPr>
         </p:nvSpPr>
-        <p:spPr/>
+        <p:spPr>
+          <a:noFill/>
+        </p:spPr>
         <p:txBody>
           <a:bodyPr/>
           <a:lstStyle/>
           <a:p>
-            <a:endParaRPr lang="en-US" sz="1700"/>
-          </a:p>
-        </p:txBody>
-      </p:sp>
-      <p:sp>
-        <p:nvSpPr>
-          <p:cNvPr id="14342" name="Rectangle 6"/>
-          <p:cNvSpPr>
-            <a:spLocks noGrp="1" noChangeArrowheads="1"/>
-          </p:cNvSpPr>
-          <p:nvPr>
-            <p:ph type="body" sz="half" idx="2"/>
-          </p:nvPr>
-        </p:nvSpPr>
-        <p:spPr/>
-        <p:txBody>
-          <a:bodyPr/>
-          <a:lstStyle/>
-          <a:p>
-            <a:endParaRPr lang="en-US" sz="1700"/>
+            <a:r>
+              <a:rPr lang="en-US" dirty="0" err="1"/>
+              <a:t>Fließtext</a:t>
+            </a:r>
+            <a:r>
+              <a:rPr lang="en-US" dirty="0"/>
+              <a:t> </a:t>
+            </a:r>
+            <a:r>
+              <a:rPr lang="en-US" dirty="0" err="1"/>
+              <a:t>ohne</a:t>
+            </a:r>
+            <a:r>
+              <a:rPr lang="en-US" dirty="0"/>
+              <a:t> </a:t>
+            </a:r>
+            <a:r>
+              <a:rPr lang="en-US" dirty="0" err="1"/>
+              <a:t>Aufzählung</a:t>
+            </a:r>
+            <a:r>
+              <a:rPr lang="en-US" dirty="0"/>
+              <a:t> und </a:t>
+            </a:r>
+            <a:r>
+              <a:rPr lang="en-US" dirty="0" err="1"/>
+              <a:t>Einrückung</a:t>
+            </a:r>
+            <a:r>
+              <a:rPr lang="en-US" dirty="0"/>
+              <a:t>. </a:t>
+            </a:r>
+            <a:r>
+              <a:rPr lang="en-US" b="1" dirty="0" err="1"/>
+              <a:t>Hervorhebung</a:t>
+            </a:r>
+            <a:r>
+              <a:rPr lang="en-US" dirty="0"/>
+              <a:t> </a:t>
+            </a:r>
+            <a:r>
+              <a:rPr lang="en-US" dirty="0" err="1"/>
+              <a:t>ist</a:t>
+            </a:r>
+            <a:r>
+              <a:rPr lang="en-US" dirty="0"/>
+              <a:t> in </a:t>
+            </a:r>
+            <a:r>
+              <a:rPr lang="en-US" dirty="0" err="1"/>
+              <a:t>allen</a:t>
+            </a:r>
+            <a:r>
+              <a:rPr lang="en-US" dirty="0"/>
+              <a:t> </a:t>
+            </a:r>
+            <a:r>
+              <a:rPr lang="en-US" dirty="0" err="1"/>
+              <a:t>Ebenen</a:t>
+            </a:r>
+            <a:r>
+              <a:rPr lang="en-US" dirty="0"/>
+              <a:t> </a:t>
+            </a:r>
+            <a:r>
+              <a:rPr lang="en-US" dirty="0" err="1"/>
+              <a:t>fett</a:t>
+            </a:r>
+            <a:r>
+              <a:rPr lang="en-US" dirty="0"/>
+              <a:t>.</a:t>
+            </a:r>
+          </a:p>
+          <a:p>
+            <a:pPr lvl="1"/>
+            <a:r>
+              <a:rPr lang="en-US" dirty="0" err="1"/>
+              <a:t>Zweite</a:t>
+            </a:r>
+            <a:r>
+              <a:rPr lang="en-US" dirty="0"/>
+              <a:t> </a:t>
+            </a:r>
+            <a:r>
+              <a:rPr lang="en-US" dirty="0" err="1"/>
+              <a:t>Ebene</a:t>
+            </a:r>
+            <a:r>
+              <a:rPr lang="en-US" dirty="0"/>
+              <a:t> </a:t>
+            </a:r>
+            <a:r>
+              <a:rPr lang="en-US" dirty="0" err="1"/>
+              <a:t>mit</a:t>
+            </a:r>
+            <a:r>
+              <a:rPr lang="en-US" dirty="0"/>
+              <a:t> </a:t>
+            </a:r>
+            <a:r>
+              <a:rPr lang="en-US" dirty="0" err="1"/>
+              <a:t>Einrückung</a:t>
+            </a:r>
+            <a:r>
+              <a:rPr lang="en-US" dirty="0"/>
+              <a:t> und </a:t>
+            </a:r>
+            <a:r>
+              <a:rPr lang="en-US" dirty="0" err="1"/>
+              <a:t>Aufzählungszeichen</a:t>
+            </a:r>
+            <a:endParaRPr lang="en-US" dirty="0"/>
+          </a:p>
+          <a:p>
+            <a:pPr lvl="2"/>
+            <a:r>
+              <a:rPr lang="en-US" dirty="0" err="1"/>
+              <a:t>Dritte</a:t>
+            </a:r>
+            <a:r>
+              <a:rPr lang="en-US" dirty="0"/>
+              <a:t> </a:t>
+            </a:r>
+            <a:r>
+              <a:rPr lang="en-US" dirty="0" err="1"/>
+              <a:t>Ebene</a:t>
+            </a:r>
+            <a:r>
+              <a:rPr lang="en-US" dirty="0"/>
+              <a:t> </a:t>
+            </a:r>
+            <a:r>
+              <a:rPr lang="en-US" dirty="0" err="1"/>
+              <a:t>mit</a:t>
+            </a:r>
+            <a:r>
+              <a:rPr lang="en-US" dirty="0"/>
+              <a:t> </a:t>
+            </a:r>
+            <a:r>
+              <a:rPr lang="en-US" dirty="0" err="1"/>
+              <a:t>Einrückung</a:t>
+            </a:r>
+            <a:r>
+              <a:rPr lang="en-US" dirty="0"/>
+              <a:t> und </a:t>
+            </a:r>
+            <a:r>
+              <a:rPr lang="en-US" dirty="0" err="1"/>
+              <a:t>Aufzählungszeichen</a:t>
+            </a:r>
+            <a:endParaRPr lang="en-US" dirty="0"/>
+          </a:p>
+          <a:p>
+            <a:pPr lvl="3"/>
+            <a:r>
+              <a:rPr lang="en-US" dirty="0" err="1"/>
+              <a:t>Vierte</a:t>
+            </a:r>
+            <a:r>
+              <a:rPr lang="en-US" dirty="0"/>
+              <a:t> </a:t>
+            </a:r>
+            <a:r>
+              <a:rPr lang="en-US" dirty="0" err="1"/>
+              <a:t>Ebene</a:t>
+            </a:r>
+            <a:r>
+              <a:rPr lang="en-US" dirty="0"/>
+              <a:t> </a:t>
+            </a:r>
+            <a:r>
+              <a:rPr lang="en-US" dirty="0" err="1"/>
+              <a:t>kursiv</a:t>
+            </a:r>
+            <a:r>
+              <a:rPr lang="en-US" dirty="0"/>
+              <a:t> </a:t>
+            </a:r>
+            <a:r>
+              <a:rPr lang="en-US" dirty="0" err="1"/>
+              <a:t>mit</a:t>
+            </a:r>
+            <a:r>
+              <a:rPr lang="en-US" dirty="0"/>
+              <a:t> </a:t>
+            </a:r>
+            <a:r>
+              <a:rPr lang="en-US" dirty="0" err="1"/>
+              <a:t>Einrückung</a:t>
+            </a:r>
+            <a:r>
+              <a:rPr lang="en-US" dirty="0"/>
+              <a:t> und </a:t>
+            </a:r>
+            <a:r>
+              <a:rPr lang="en-US" dirty="0" err="1"/>
+              <a:t>Aufzählungszeichen</a:t>
+            </a:r>
+            <a:endParaRPr lang="en-US" dirty="0"/>
+          </a:p>
+          <a:p>
+            <a:pPr lvl="4"/>
+            <a:r>
+              <a:rPr lang="en-US" dirty="0" err="1"/>
+              <a:t>Fünfte</a:t>
+            </a:r>
+            <a:r>
+              <a:rPr lang="en-US" dirty="0"/>
+              <a:t> </a:t>
+            </a:r>
+            <a:r>
+              <a:rPr lang="en-US" dirty="0" err="1"/>
+              <a:t>Ebene</a:t>
+            </a:r>
+            <a:r>
+              <a:rPr lang="en-US" dirty="0"/>
+              <a:t> </a:t>
+            </a:r>
+            <a:r>
+              <a:rPr lang="en-US" dirty="0" err="1"/>
+              <a:t>mit</a:t>
+            </a:r>
+            <a:r>
+              <a:rPr lang="en-US" dirty="0"/>
+              <a:t> </a:t>
+            </a:r>
+            <a:r>
+              <a:rPr lang="en-US" dirty="0" err="1"/>
+              <a:t>Einrückung</a:t>
+            </a:r>
+            <a:r>
+              <a:rPr lang="en-US" dirty="0"/>
+              <a:t> und </a:t>
+            </a:r>
+            <a:r>
+              <a:rPr lang="en-US" dirty="0" err="1"/>
+              <a:t>Aufzählungszeichen</a:t>
+            </a:r>
+            <a:endParaRPr lang="en-US" dirty="0"/>
           </a:p>
         </p:txBody>
       </p:sp>
     </p:spTree>
+    <p:extLst>
+      <p:ext uri="{BB962C8B-B14F-4D97-AF65-F5344CB8AC3E}">
+        <p14:creationId xmlns:p14="http://schemas.microsoft.com/office/powerpoint/2010/main" val="2104484652"/>
+      </p:ext>
+    </p:extLst>
   </p:cSld>
   <p:clrMapOvr>
     <a:masterClrMapping/>
   </p:clrMapOvr>
+  <p:timing>
+    <p:tnLst>
+      <p:par>
+        <p:cTn id="1" dur="indefinite" restart="never" nodeType="tmRoot"/>
+      </p:par>
+    </p:tnLst>
+  </p:timing>
 </p:sld>
 </file>
 
@@ -9083,10 +9370,131 @@
               <a:rPr lang="de-DE"/>
               <a:t>Seite </a:t>
             </a:r>
+            <a:fld id="{CAEED438-B660-4C04-BC25-4C23CCFBC7F4}" type="slidenum">
+              <a:rPr lang="de-DE"/>
+              <a:pPr/>
+              <a:t>16</a:t>
+            </a:fld>
+            <a:endParaRPr lang="de-DE"/>
+          </a:p>
+        </p:txBody>
+      </p:sp>
+      <p:sp>
+        <p:nvSpPr>
+          <p:cNvPr id="14340" name="Rectangle 4"/>
+          <p:cNvSpPr>
+            <a:spLocks noGrp="1" noChangeArrowheads="1"/>
+          </p:cNvSpPr>
+          <p:nvPr>
+            <p:ph type="title"/>
+          </p:nvPr>
+        </p:nvSpPr>
+        <p:spPr/>
+        <p:txBody>
+          <a:bodyPr/>
+          <a:lstStyle/>
+          <a:p>
+            <a:r>
+              <a:rPr lang="en-US"/>
+              <a:t>Textfolie zweispaltig</a:t>
+            </a:r>
+            <a:br>
+              <a:rPr lang="en-US"/>
+            </a:br>
+            <a:r>
+              <a:rPr lang="de-DE" sz="2400" b="0" i="1"/>
+              <a:t>Hier steht die Subheadline</a:t>
+            </a:r>
+            <a:endParaRPr lang="en-US" sz="2400" b="0" i="1"/>
+          </a:p>
+        </p:txBody>
+      </p:sp>
+      <p:sp>
+        <p:nvSpPr>
+          <p:cNvPr id="14341" name="Rectangle 5"/>
+          <p:cNvSpPr>
+            <a:spLocks noGrp="1" noChangeArrowheads="1"/>
+          </p:cNvSpPr>
+          <p:nvPr>
+            <p:ph type="body" sz="half" idx="1"/>
+          </p:nvPr>
+        </p:nvSpPr>
+        <p:spPr/>
+        <p:txBody>
+          <a:bodyPr/>
+          <a:lstStyle/>
+          <a:p>
+            <a:endParaRPr lang="en-US" sz="1700"/>
+          </a:p>
+        </p:txBody>
+      </p:sp>
+      <p:sp>
+        <p:nvSpPr>
+          <p:cNvPr id="14342" name="Rectangle 6"/>
+          <p:cNvSpPr>
+            <a:spLocks noGrp="1" noChangeArrowheads="1"/>
+          </p:cNvSpPr>
+          <p:nvPr>
+            <p:ph type="body" sz="half" idx="2"/>
+          </p:nvPr>
+        </p:nvSpPr>
+        <p:spPr/>
+        <p:txBody>
+          <a:bodyPr/>
+          <a:lstStyle/>
+          <a:p>
+            <a:endParaRPr lang="en-US" sz="1700"/>
+          </a:p>
+        </p:txBody>
+      </p:sp>
+    </p:spTree>
+  </p:cSld>
+  <p:clrMapOvr>
+    <a:masterClrMapping/>
+  </p:clrMapOvr>
+</p:sld>
+</file>
+
+<file path=ppt/slides/slide17.xml><?xml version="1.0" encoding="utf-8"?>
+<p:sld xmlns:a="http://schemas.openxmlformats.org/drawingml/2006/main" xmlns:r="http://schemas.openxmlformats.org/officeDocument/2006/relationships" xmlns:p="http://schemas.openxmlformats.org/presentationml/2006/main">
+  <p:cSld>
+    <p:spTree>
+      <p:nvGrpSpPr>
+        <p:cNvPr id="1" name=""/>
+        <p:cNvGrpSpPr/>
+        <p:nvPr/>
+      </p:nvGrpSpPr>
+      <p:grpSpPr>
+        <a:xfrm>
+          <a:off x="0" y="0"/>
+          <a:ext cx="0" cy="0"/>
+          <a:chOff x="0" y="0"/>
+          <a:chExt cx="0" cy="0"/>
+        </a:xfrm>
+      </p:grpSpPr>
+      <p:sp>
+        <p:nvSpPr>
+          <p:cNvPr id="5" name="Foliennummernplatzhalter 4"/>
+          <p:cNvSpPr>
+            <a:spLocks noGrp="1"/>
+          </p:cNvSpPr>
+          <p:nvPr>
+            <p:ph type="sldNum" sz="quarter" idx="10"/>
+          </p:nvPr>
+        </p:nvSpPr>
+        <p:spPr/>
+        <p:txBody>
+          <a:bodyPr/>
+          <a:lstStyle/>
+          <a:p>
+            <a:r>
+              <a:rPr lang="de-DE"/>
+              <a:t>Seite </a:t>
+            </a:r>
             <a:fld id="{4D35A6D1-10F6-44CF-9111-9D0A7E046229}" type="slidenum">
               <a:rPr lang="de-DE"/>
               <a:pPr/>
-              <a:t>16</a:t>
+              <a:t>17</a:t>
             </a:fld>
             <a:endParaRPr lang="de-DE"/>
           </a:p>
@@ -9190,14 +9598,14 @@
           <a:effectLst/>
           <a:extLst>
             <a:ext uri="{909E8E84-426E-40dd-AFC4-6F175D3DCCD1}">
-              <a14:hiddenFill xmlns="" xmlns:a14="http://schemas.microsoft.com/office/drawing/2010/main">
+              <a14:hiddenFill xmlns:a14="http://schemas.microsoft.com/office/drawing/2010/main" xmlns="">
                 <a:solidFill>
                   <a:schemeClr val="accent1"/>
                 </a:solidFill>
               </a14:hiddenFill>
             </a:ext>
             <a:ext uri="{91240B29-F687-4f45-9708-019B960494DF}">
-              <a14:hiddenLine xmlns="" xmlns:a14="http://schemas.microsoft.com/office/drawing/2010/main" w="9525">
+              <a14:hiddenLine xmlns:a14="http://schemas.microsoft.com/office/drawing/2010/main" xmlns="" w="9525">
                 <a:solidFill>
                   <a:schemeClr val="tx1"/>
                 </a:solidFill>
@@ -9207,7 +9615,7 @@
               </a14:hiddenLine>
             </a:ext>
             <a:ext uri="{AF507438-7753-43e0-B8FC-AC1667EBCBE1}">
-              <a14:hiddenEffects xmlns="" xmlns:a14="http://schemas.microsoft.com/office/drawing/2010/main">
+              <a14:hiddenEffects xmlns:a14="http://schemas.microsoft.com/office/drawing/2010/main" xmlns="">
                 <a:effectLst>
                   <a:outerShdw dist="35921" dir="2700000" algn="ctr" rotWithShape="0">
                     <a:schemeClr val="bg2"/>
@@ -9226,7 +9634,7 @@
 </p:sld>
 </file>
 
-<file path=ppt/slides/slide17.xml><?xml version="1.0" encoding="utf-8"?>
+<file path=ppt/slides/slide18.xml><?xml version="1.0" encoding="utf-8"?>
 <p:sld xmlns:a="http://schemas.openxmlformats.org/drawingml/2006/main" xmlns:r="http://schemas.openxmlformats.org/officeDocument/2006/relationships" xmlns:p="http://schemas.openxmlformats.org/presentationml/2006/main">
   <p:cSld>
     <p:spTree>
@@ -9265,7 +9673,7 @@
             <a:fld id="{77904B16-A1A9-4FCD-9130-A2400ACBA0C8}" type="slidenum">
               <a:rPr lang="de-DE"/>
               <a:pPr/>
-              <a:t>17</a:t>
+              <a:t>18</a:t>
             </a:fld>
             <a:endParaRPr lang="de-DE"/>
           </a:p>
@@ -9378,14 +9786,14 @@
           <a:effectLst/>
           <a:extLst>
             <a:ext uri="{909E8E84-426E-40dd-AFC4-6F175D3DCCD1}">
-              <a14:hiddenFill xmlns="" xmlns:a14="http://schemas.microsoft.com/office/drawing/2010/main">
+              <a14:hiddenFill xmlns:a14="http://schemas.microsoft.com/office/drawing/2010/main" xmlns="">
                 <a:solidFill>
                   <a:schemeClr val="accent1"/>
                 </a:solidFill>
               </a14:hiddenFill>
             </a:ext>
             <a:ext uri="{91240B29-F687-4f45-9708-019B960494DF}">
-              <a14:hiddenLine xmlns="" xmlns:a14="http://schemas.microsoft.com/office/drawing/2010/main" w="9525">
+              <a14:hiddenLine xmlns:a14="http://schemas.microsoft.com/office/drawing/2010/main" xmlns="" w="9525">
                 <a:solidFill>
                   <a:schemeClr val="tx1"/>
                 </a:solidFill>
@@ -9395,7 +9803,7 @@
               </a14:hiddenLine>
             </a:ext>
             <a:ext uri="{AF507438-7753-43e0-B8FC-AC1667EBCBE1}">
-              <a14:hiddenEffects xmlns="" xmlns:a14="http://schemas.microsoft.com/office/drawing/2010/main">
+              <a14:hiddenEffects xmlns:a14="http://schemas.microsoft.com/office/drawing/2010/main" xmlns="">
                 <a:effectLst>
                   <a:outerShdw dist="35921" dir="2700000" algn="ctr" rotWithShape="0">
                     <a:schemeClr val="bg2"/>
@@ -9414,7 +9822,7 @@
 </p:sld>
 </file>
 
-<file path=ppt/slides/slide18.xml><?xml version="1.0" encoding="utf-8"?>
+<file path=ppt/slides/slide19.xml><?xml version="1.0" encoding="utf-8"?>
 <p:sld xmlns:a="http://schemas.openxmlformats.org/drawingml/2006/main" xmlns:r="http://schemas.openxmlformats.org/officeDocument/2006/relationships" xmlns:p="http://schemas.openxmlformats.org/presentationml/2006/main">
   <p:cSld>
     <p:spTree>
@@ -9453,7 +9861,7 @@
             <a:fld id="{88255D18-0AF0-4429-A96E-59C5FC24C8FC}" type="slidenum">
               <a:rPr lang="de-DE"/>
               <a:pPr/>
-              <a:t>18</a:t>
+              <a:t>19</a:t>
             </a:fld>
             <a:endParaRPr lang="de-DE"/>
           </a:p>
@@ -9499,14 +9907,14 @@
           <a:effectLst/>
           <a:extLst>
             <a:ext uri="{909E8E84-426E-40dd-AFC4-6F175D3DCCD1}">
-              <a14:hiddenFill xmlns="" xmlns:a14="http://schemas.microsoft.com/office/drawing/2010/main">
+              <a14:hiddenFill xmlns:a14="http://schemas.microsoft.com/office/drawing/2010/main" xmlns="">
                 <a:solidFill>
                   <a:schemeClr val="accent1"/>
                 </a:solidFill>
               </a14:hiddenFill>
             </a:ext>
             <a:ext uri="{91240B29-F687-4f45-9708-019B960494DF}">
-              <a14:hiddenLine xmlns="" xmlns:a14="http://schemas.microsoft.com/office/drawing/2010/main" w="9525">
+              <a14:hiddenLine xmlns:a14="http://schemas.microsoft.com/office/drawing/2010/main" xmlns="" w="9525">
                 <a:solidFill>
                   <a:schemeClr val="tx1"/>
                 </a:solidFill>
@@ -9516,7 +9924,7 @@
               </a14:hiddenLine>
             </a:ext>
             <a:ext uri="{AF507438-7753-43e0-B8FC-AC1667EBCBE1}">
-              <a14:hiddenEffects xmlns="" xmlns:a14="http://schemas.microsoft.com/office/drawing/2010/main">
+              <a14:hiddenEffects xmlns:a14="http://schemas.microsoft.com/office/drawing/2010/main" xmlns="">
                 <a:effectLst>
                   <a:outerShdw dist="35921" dir="2700000" algn="ctr" rotWithShape="0">
                     <a:schemeClr val="bg2"/>
@@ -9567,14 +9975,14 @@
           <a:effectLst/>
           <a:extLst>
             <a:ext uri="{909E8E84-426E-40dd-AFC4-6F175D3DCCD1}">
-              <a14:hiddenFill xmlns="" xmlns:a14="http://schemas.microsoft.com/office/drawing/2010/main">
+              <a14:hiddenFill xmlns:a14="http://schemas.microsoft.com/office/drawing/2010/main" xmlns="">
                 <a:solidFill>
                   <a:schemeClr val="accent1"/>
                 </a:solidFill>
               </a14:hiddenFill>
             </a:ext>
             <a:ext uri="{91240B29-F687-4f45-9708-019B960494DF}">
-              <a14:hiddenLine xmlns="" xmlns:a14="http://schemas.microsoft.com/office/drawing/2010/main" w="9525">
+              <a14:hiddenLine xmlns:a14="http://schemas.microsoft.com/office/drawing/2010/main" xmlns="" w="9525">
                 <a:solidFill>
                   <a:schemeClr val="tx1"/>
                 </a:solidFill>
@@ -9584,7 +9992,7 @@
               </a14:hiddenLine>
             </a:ext>
             <a:ext uri="{AF507438-7753-43e0-B8FC-AC1667EBCBE1}">
-              <a14:hiddenEffects xmlns="" xmlns:a14="http://schemas.microsoft.com/office/drawing/2010/main">
+              <a14:hiddenEffects xmlns:a14="http://schemas.microsoft.com/office/drawing/2010/main" xmlns="">
                 <a:effectLst>
                   <a:outerShdw dist="35921" dir="2700000" algn="ctr" rotWithShape="0">
                     <a:schemeClr val="bg2"/>
@@ -9659,165 +10067,6 @@
             <a:r>
               <a:rPr lang="en-US" sz="1400"/>
               <a:t>Und zusätzlicher beschreibender Text 14 pt</a:t>
-            </a:r>
-          </a:p>
-        </p:txBody>
-      </p:sp>
-    </p:spTree>
-  </p:cSld>
-  <p:clrMapOvr>
-    <a:masterClrMapping/>
-  </p:clrMapOvr>
-</p:sld>
-</file>
-
-<file path=ppt/slides/slide19.xml><?xml version="1.0" encoding="utf-8"?>
-<p:sld xmlns:a="http://schemas.openxmlformats.org/drawingml/2006/main" xmlns:r="http://schemas.openxmlformats.org/officeDocument/2006/relationships" xmlns:p="http://schemas.openxmlformats.org/presentationml/2006/main">
-  <p:cSld>
-    <p:spTree>
-      <p:nvGrpSpPr>
-        <p:cNvPr id="1" name=""/>
-        <p:cNvGrpSpPr/>
-        <p:nvPr/>
-      </p:nvGrpSpPr>
-      <p:grpSpPr>
-        <a:xfrm>
-          <a:off x="0" y="0"/>
-          <a:ext cx="0" cy="0"/>
-          <a:chOff x="0" y="0"/>
-          <a:chExt cx="0" cy="0"/>
-        </a:xfrm>
-      </p:grpSpPr>
-      <p:sp>
-        <p:nvSpPr>
-          <p:cNvPr id="4" name="Foliennummernplatzhalter 1"/>
-          <p:cNvSpPr>
-            <a:spLocks noGrp="1"/>
-          </p:cNvSpPr>
-          <p:nvPr>
-            <p:ph type="sldNum" sz="quarter" idx="10"/>
-          </p:nvPr>
-        </p:nvSpPr>
-        <p:spPr/>
-        <p:txBody>
-          <a:bodyPr/>
-          <a:lstStyle/>
-          <a:p>
-            <a:r>
-              <a:rPr lang="de-DE"/>
-              <a:t>Seite </a:t>
-            </a:r>
-            <a:fld id="{1959A76B-4404-45BA-8D74-04ED350576FE}" type="slidenum">
-              <a:rPr lang="de-DE"/>
-              <a:pPr/>
-              <a:t>19</a:t>
-            </a:fld>
-            <a:endParaRPr lang="de-DE"/>
-          </a:p>
-        </p:txBody>
-      </p:sp>
-      <p:pic>
-        <p:nvPicPr>
-          <p:cNvPr id="21506" name="Picture 2" descr="Platzhalterbild"/>
-          <p:cNvPicPr>
-            <a:picLocks noChangeAspect="1" noChangeArrowheads="1"/>
-          </p:cNvPicPr>
-          <p:nvPr/>
-        </p:nvPicPr>
-        <p:blipFill>
-          <a:blip r:embed="rId2">
-            <a:extLst>
-              <a:ext uri="{28A0092B-C50C-407E-A947-70E740481C1C}">
-                <a14:useLocalDpi xmlns:a14="http://schemas.microsoft.com/office/drawing/2010/main" val="0"/>
-              </a:ext>
-            </a:extLst>
-          </a:blip>
-          <a:srcRect/>
-          <a:stretch>
-            <a:fillRect/>
-          </a:stretch>
-        </p:blipFill>
-        <p:spPr bwMode="auto">
-          <a:xfrm>
-            <a:off x="0" y="1588"/>
-            <a:ext cx="10693400" cy="7561262"/>
-          </a:xfrm>
-          <a:prstGeom prst="rect">
-            <a:avLst/>
-          </a:prstGeom>
-          <a:noFill/>
-          <a:extLst>
-            <a:ext uri="{909E8E84-426E-40dd-AFC4-6F175D3DCCD1}">
-              <a14:hiddenFill xmlns="" xmlns:a14="http://schemas.microsoft.com/office/drawing/2010/main">
-                <a:solidFill>
-                  <a:srgbClr val="FFFFFF"/>
-                </a:solidFill>
-              </a14:hiddenFill>
-            </a:ext>
-          </a:extLst>
-        </p:spPr>
-      </p:pic>
-      <p:sp>
-        <p:nvSpPr>
-          <p:cNvPr id="21508" name="Text Box 4"/>
-          <p:cNvSpPr txBox="1">
-            <a:spLocks noChangeArrowheads="1"/>
-          </p:cNvSpPr>
-          <p:nvPr/>
-        </p:nvSpPr>
-        <p:spPr bwMode="auto">
-          <a:xfrm>
-            <a:off x="522288" y="5564188"/>
-            <a:ext cx="4248150" cy="1457325"/>
-          </a:xfrm>
-          <a:prstGeom prst="rect">
-            <a:avLst/>
-          </a:prstGeom>
-          <a:solidFill>
-            <a:schemeClr val="accent1"/>
-          </a:solidFill>
-          <a:ln>
-            <a:noFill/>
-          </a:ln>
-          <a:effectLst/>
-          <a:extLst/>
-        </p:spPr>
-        <p:txBody>
-          <a:bodyPr lIns="182880" tIns="137160" rIns="182880" bIns="137160"/>
-          <a:lstStyle/>
-          <a:p>
-            <a:pPr algn="l"/>
-            <a:r>
-              <a:rPr lang="en-US"/>
-              <a:t>Ficiatisti blabor sum, comnis nis sendes aut</a:t>
-            </a:r>
-          </a:p>
-          <a:p>
-            <a:pPr algn="l"/>
-            <a:r>
-              <a:rPr lang="en-US"/>
-              <a:t>pressimus re litata saperum repelliquas ut quibus</a:t>
-            </a:r>
-          </a:p>
-          <a:p>
-            <a:pPr algn="l"/>
-            <a:r>
-              <a:rPr lang="en-US"/>
-              <a:t>aceptatis estiis autem essitate est fugiatet int hilis</a:t>
-            </a:r>
-          </a:p>
-          <a:p>
-            <a:pPr algn="l"/>
-            <a:r>
-              <a:rPr lang="en-US"/>
-              <a:t>doloriae ipsania vero quo dolora dolut evelique</a:t>
-            </a:r>
-          </a:p>
-          <a:p>
-            <a:pPr algn="l"/>
-            <a:r>
-              <a:rPr lang="en-US"/>
-              <a:t>num cor auda dignisq uianda alique asimpore</a:t>
             </a:r>
           </a:p>
         </p:txBody>
@@ -9920,21 +10169,21 @@
                 <a:gridCol w="1439862">
                   <a:extLst>
                     <a:ext uri="{9D8B030D-6E8A-4147-A177-3AD203B41FA5}">
-                      <a16:colId xmlns:a16="http://schemas.microsoft.com/office/drawing/2014/main" xmlns="" val="20000"/>
+                      <a16:colId xmlns:a16="http://schemas.microsoft.com/office/drawing/2014/main" val="20000"/>
                     </a:ext>
                   </a:extLst>
                 </a:gridCol>
                 <a:gridCol w="5761038">
                   <a:extLst>
                     <a:ext uri="{9D8B030D-6E8A-4147-A177-3AD203B41FA5}">
-                      <a16:colId xmlns:a16="http://schemas.microsoft.com/office/drawing/2014/main" xmlns="" val="20001"/>
+                      <a16:colId xmlns:a16="http://schemas.microsoft.com/office/drawing/2014/main" val="20001"/>
                     </a:ext>
                   </a:extLst>
                 </a:gridCol>
                 <a:gridCol w="1223962">
                   <a:extLst>
                     <a:ext uri="{9D8B030D-6E8A-4147-A177-3AD203B41FA5}">
-                      <a16:colId xmlns:a16="http://schemas.microsoft.com/office/drawing/2014/main" xmlns="" val="20002"/>
+                      <a16:colId xmlns:a16="http://schemas.microsoft.com/office/drawing/2014/main" val="20002"/>
                     </a:ext>
                   </a:extLst>
                 </a:gridCol>
@@ -10240,7 +10489,7 @@
                 </a:tc>
                 <a:extLst>
                   <a:ext uri="{0D108BD9-81ED-4DB2-BD59-A6C34878D82A}">
-                    <a16:rowId xmlns:a16="http://schemas.microsoft.com/office/drawing/2014/main" xmlns="" val="10000"/>
+                    <a16:rowId xmlns:a16="http://schemas.microsoft.com/office/drawing/2014/main" val="10000"/>
                   </a:ext>
                 </a:extLst>
               </a:tr>
@@ -10275,6 +10524,165 @@
       </p:grpSpPr>
       <p:sp>
         <p:nvSpPr>
+          <p:cNvPr id="4" name="Foliennummernplatzhalter 1"/>
+          <p:cNvSpPr>
+            <a:spLocks noGrp="1"/>
+          </p:cNvSpPr>
+          <p:nvPr>
+            <p:ph type="sldNum" sz="quarter" idx="10"/>
+          </p:nvPr>
+        </p:nvSpPr>
+        <p:spPr/>
+        <p:txBody>
+          <a:bodyPr/>
+          <a:lstStyle/>
+          <a:p>
+            <a:r>
+              <a:rPr lang="de-DE"/>
+              <a:t>Seite </a:t>
+            </a:r>
+            <a:fld id="{1959A76B-4404-45BA-8D74-04ED350576FE}" type="slidenum">
+              <a:rPr lang="de-DE"/>
+              <a:pPr/>
+              <a:t>20</a:t>
+            </a:fld>
+            <a:endParaRPr lang="de-DE"/>
+          </a:p>
+        </p:txBody>
+      </p:sp>
+      <p:pic>
+        <p:nvPicPr>
+          <p:cNvPr id="21506" name="Picture 2" descr="Platzhalterbild"/>
+          <p:cNvPicPr>
+            <a:picLocks noChangeAspect="1" noChangeArrowheads="1"/>
+          </p:cNvPicPr>
+          <p:nvPr/>
+        </p:nvPicPr>
+        <p:blipFill>
+          <a:blip r:embed="rId2">
+            <a:extLst>
+              <a:ext uri="{28A0092B-C50C-407E-A947-70E740481C1C}">
+                <a14:useLocalDpi xmlns:a14="http://schemas.microsoft.com/office/drawing/2010/main" val="0"/>
+              </a:ext>
+            </a:extLst>
+          </a:blip>
+          <a:srcRect/>
+          <a:stretch>
+            <a:fillRect/>
+          </a:stretch>
+        </p:blipFill>
+        <p:spPr bwMode="auto">
+          <a:xfrm>
+            <a:off x="0" y="1588"/>
+            <a:ext cx="10693400" cy="7561262"/>
+          </a:xfrm>
+          <a:prstGeom prst="rect">
+            <a:avLst/>
+          </a:prstGeom>
+          <a:noFill/>
+          <a:extLst>
+            <a:ext uri="{909E8E84-426E-40dd-AFC4-6F175D3DCCD1}">
+              <a14:hiddenFill xmlns:a14="http://schemas.microsoft.com/office/drawing/2010/main" xmlns="">
+                <a:solidFill>
+                  <a:srgbClr val="FFFFFF"/>
+                </a:solidFill>
+              </a14:hiddenFill>
+            </a:ext>
+          </a:extLst>
+        </p:spPr>
+      </p:pic>
+      <p:sp>
+        <p:nvSpPr>
+          <p:cNvPr id="21508" name="Text Box 4"/>
+          <p:cNvSpPr txBox="1">
+            <a:spLocks noChangeArrowheads="1"/>
+          </p:cNvSpPr>
+          <p:nvPr/>
+        </p:nvSpPr>
+        <p:spPr bwMode="auto">
+          <a:xfrm>
+            <a:off x="522288" y="5564188"/>
+            <a:ext cx="4248150" cy="1457325"/>
+          </a:xfrm>
+          <a:prstGeom prst="rect">
+            <a:avLst/>
+          </a:prstGeom>
+          <a:solidFill>
+            <a:schemeClr val="accent1"/>
+          </a:solidFill>
+          <a:ln>
+            <a:noFill/>
+          </a:ln>
+          <a:effectLst/>
+          <a:extLst/>
+        </p:spPr>
+        <p:txBody>
+          <a:bodyPr lIns="182880" tIns="137160" rIns="182880" bIns="137160"/>
+          <a:lstStyle/>
+          <a:p>
+            <a:pPr algn="l"/>
+            <a:r>
+              <a:rPr lang="en-US"/>
+              <a:t>Ficiatisti blabor sum, comnis nis sendes aut</a:t>
+            </a:r>
+          </a:p>
+          <a:p>
+            <a:pPr algn="l"/>
+            <a:r>
+              <a:rPr lang="en-US"/>
+              <a:t>pressimus re litata saperum repelliquas ut quibus</a:t>
+            </a:r>
+          </a:p>
+          <a:p>
+            <a:pPr algn="l"/>
+            <a:r>
+              <a:rPr lang="en-US"/>
+              <a:t>aceptatis estiis autem essitate est fugiatet int hilis</a:t>
+            </a:r>
+          </a:p>
+          <a:p>
+            <a:pPr algn="l"/>
+            <a:r>
+              <a:rPr lang="en-US"/>
+              <a:t>doloriae ipsania vero quo dolora dolut evelique</a:t>
+            </a:r>
+          </a:p>
+          <a:p>
+            <a:pPr algn="l"/>
+            <a:r>
+              <a:rPr lang="en-US"/>
+              <a:t>num cor auda dignisq uianda alique asimpore</a:t>
+            </a:r>
+          </a:p>
+        </p:txBody>
+      </p:sp>
+    </p:spTree>
+  </p:cSld>
+  <p:clrMapOvr>
+    <a:masterClrMapping/>
+  </p:clrMapOvr>
+</p:sld>
+</file>
+
+<file path=ppt/slides/slide21.xml><?xml version="1.0" encoding="utf-8"?>
+<p:sld xmlns:a="http://schemas.openxmlformats.org/drawingml/2006/main" xmlns:r="http://schemas.openxmlformats.org/officeDocument/2006/relationships" xmlns:p="http://schemas.openxmlformats.org/presentationml/2006/main">
+  <p:cSld>
+    <p:spTree>
+      <p:nvGrpSpPr>
+        <p:cNvPr id="1" name=""/>
+        <p:cNvGrpSpPr/>
+        <p:nvPr/>
+      </p:nvGrpSpPr>
+      <p:grpSpPr>
+        <a:xfrm>
+          <a:off x="0" y="0"/>
+          <a:ext cx="0" cy="0"/>
+          <a:chOff x="0" y="0"/>
+          <a:chExt cx="0" cy="0"/>
+        </a:xfrm>
+      </p:grpSpPr>
+      <p:sp>
+        <p:nvSpPr>
           <p:cNvPr id="21" name="Foliennummernplatzhalter 2"/>
           <p:cNvSpPr>
             <a:spLocks noGrp="1"/>
@@ -10295,7 +10703,7 @@
             <a:fld id="{ABA64F84-B00F-4D7A-8D8C-DC84E8EED2A7}" type="slidenum">
               <a:rPr lang="de-DE"/>
               <a:pPr/>
-              <a:t>20</a:t>
+              <a:t>21</a:t>
             </a:fld>
             <a:endParaRPr lang="de-DE"/>
           </a:p>
@@ -10749,12 +11157,12 @@
           <a:effectLst/>
           <a:extLst>
             <a:ext uri="{909E8E84-426E-40dd-AFC4-6F175D3DCCD1}">
-              <a14:hiddenFill xmlns="" xmlns:a14="http://schemas.microsoft.com/office/drawing/2010/main">
+              <a14:hiddenFill xmlns:a14="http://schemas.microsoft.com/office/drawing/2010/main" xmlns="">
                 <a:noFill/>
               </a14:hiddenFill>
             </a:ext>
             <a:ext uri="{AF507438-7753-43e0-B8FC-AC1667EBCBE1}">
-              <a14:hiddenEffects xmlns="" xmlns:a14="http://schemas.microsoft.com/office/drawing/2010/main">
+              <a14:hiddenEffects xmlns:a14="http://schemas.microsoft.com/office/drawing/2010/main" xmlns="">
                 <a:effectLst>
                   <a:outerShdw dist="35921" dir="2700000" algn="ctr" rotWithShape="0">
                     <a:schemeClr val="bg2"/>
@@ -10801,12 +11209,12 @@
           <a:effectLst/>
           <a:extLst>
             <a:ext uri="{909E8E84-426E-40dd-AFC4-6F175D3DCCD1}">
-              <a14:hiddenFill xmlns="" xmlns:a14="http://schemas.microsoft.com/office/drawing/2010/main">
+              <a14:hiddenFill xmlns:a14="http://schemas.microsoft.com/office/drawing/2010/main" xmlns="">
                 <a:noFill/>
               </a14:hiddenFill>
             </a:ext>
             <a:ext uri="{AF507438-7753-43e0-B8FC-AC1667EBCBE1}">
-              <a14:hiddenEffects xmlns="" xmlns:a14="http://schemas.microsoft.com/office/drawing/2010/main">
+              <a14:hiddenEffects xmlns:a14="http://schemas.microsoft.com/office/drawing/2010/main" xmlns="">
                 <a:effectLst>
                   <a:outerShdw dist="35921" dir="2700000" algn="ctr" rotWithShape="0">
                     <a:schemeClr val="bg2"/>
@@ -10853,12 +11261,12 @@
           <a:effectLst/>
           <a:extLst>
             <a:ext uri="{909E8E84-426E-40dd-AFC4-6F175D3DCCD1}">
-              <a14:hiddenFill xmlns="" xmlns:a14="http://schemas.microsoft.com/office/drawing/2010/main">
+              <a14:hiddenFill xmlns:a14="http://schemas.microsoft.com/office/drawing/2010/main" xmlns="">
                 <a:noFill/>
               </a14:hiddenFill>
             </a:ext>
             <a:ext uri="{AF507438-7753-43e0-B8FC-AC1667EBCBE1}">
-              <a14:hiddenEffects xmlns="" xmlns:a14="http://schemas.microsoft.com/office/drawing/2010/main">
+              <a14:hiddenEffects xmlns:a14="http://schemas.microsoft.com/office/drawing/2010/main" xmlns="">
                 <a:effectLst>
                   <a:outerShdw dist="35921" dir="2700000" algn="ctr" rotWithShape="0">
                     <a:schemeClr val="bg2"/>
@@ -10905,12 +11313,12 @@
           <a:effectLst/>
           <a:extLst>
             <a:ext uri="{909E8E84-426E-40dd-AFC4-6F175D3DCCD1}">
-              <a14:hiddenFill xmlns="" xmlns:a14="http://schemas.microsoft.com/office/drawing/2010/main">
+              <a14:hiddenFill xmlns:a14="http://schemas.microsoft.com/office/drawing/2010/main" xmlns="">
                 <a:noFill/>
               </a14:hiddenFill>
             </a:ext>
             <a:ext uri="{AF507438-7753-43e0-B8FC-AC1667EBCBE1}">
-              <a14:hiddenEffects xmlns="" xmlns:a14="http://schemas.microsoft.com/office/drawing/2010/main">
+              <a14:hiddenEffects xmlns:a14="http://schemas.microsoft.com/office/drawing/2010/main" xmlns="">
                 <a:effectLst>
                   <a:outerShdw dist="35921" dir="2700000" algn="ctr" rotWithShape="0">
                     <a:schemeClr val="bg2"/>
@@ -10957,12 +11365,12 @@
           <a:effectLst/>
           <a:extLst>
             <a:ext uri="{909E8E84-426E-40dd-AFC4-6F175D3DCCD1}">
-              <a14:hiddenFill xmlns="" xmlns:a14="http://schemas.microsoft.com/office/drawing/2010/main">
+              <a14:hiddenFill xmlns:a14="http://schemas.microsoft.com/office/drawing/2010/main" xmlns="">
                 <a:noFill/>
               </a14:hiddenFill>
             </a:ext>
             <a:ext uri="{AF507438-7753-43e0-B8FC-AC1667EBCBE1}">
-              <a14:hiddenEffects xmlns="" xmlns:a14="http://schemas.microsoft.com/office/drawing/2010/main">
+              <a14:hiddenEffects xmlns:a14="http://schemas.microsoft.com/office/drawing/2010/main" xmlns="">
                 <a:effectLst>
                   <a:outerShdw dist="35921" dir="2700000" algn="ctr" rotWithShape="0">
                     <a:schemeClr val="bg2"/>
@@ -11009,12 +11417,12 @@
           <a:effectLst/>
           <a:extLst>
             <a:ext uri="{909E8E84-426E-40dd-AFC4-6F175D3DCCD1}">
-              <a14:hiddenFill xmlns="" xmlns:a14="http://schemas.microsoft.com/office/drawing/2010/main">
+              <a14:hiddenFill xmlns:a14="http://schemas.microsoft.com/office/drawing/2010/main" xmlns="">
                 <a:noFill/>
               </a14:hiddenFill>
             </a:ext>
             <a:ext uri="{AF507438-7753-43e0-B8FC-AC1667EBCBE1}">
-              <a14:hiddenEffects xmlns="" xmlns:a14="http://schemas.microsoft.com/office/drawing/2010/main">
+              <a14:hiddenEffects xmlns:a14="http://schemas.microsoft.com/office/drawing/2010/main" xmlns="">
                 <a:effectLst>
                   <a:outerShdw dist="35921" dir="2700000" algn="ctr" rotWithShape="0">
                     <a:schemeClr val="bg2"/>
@@ -11095,14 +11503,14 @@
           <a:effectLst/>
           <a:extLst>
             <a:ext uri="{909E8E84-426E-40dd-AFC4-6F175D3DCCD1}">
-              <a14:hiddenFill xmlns="" xmlns:a14="http://schemas.microsoft.com/office/drawing/2010/main">
+              <a14:hiddenFill xmlns:a14="http://schemas.microsoft.com/office/drawing/2010/main" xmlns="">
                 <a:solidFill>
                   <a:srgbClr val="FFFFFF"/>
                 </a:solidFill>
               </a14:hiddenFill>
             </a:ext>
             <a:ext uri="{AF507438-7753-43e0-B8FC-AC1667EBCBE1}">
-              <a14:hiddenEffects xmlns="" xmlns:a14="http://schemas.microsoft.com/office/drawing/2010/main">
+              <a14:hiddenEffects xmlns:a14="http://schemas.microsoft.com/office/drawing/2010/main" xmlns="">
                 <a:effectLst>
                   <a:outerShdw dist="35921" dir="2700000" algn="ctr" rotWithShape="0">
                     <a:schemeClr val="bg2"/>
@@ -11183,14 +11591,14 @@
           <a:effectLst/>
           <a:extLst>
             <a:ext uri="{909E8E84-426E-40dd-AFC4-6F175D3DCCD1}">
-              <a14:hiddenFill xmlns="" xmlns:a14="http://schemas.microsoft.com/office/drawing/2010/main">
+              <a14:hiddenFill xmlns:a14="http://schemas.microsoft.com/office/drawing/2010/main" xmlns="">
                 <a:solidFill>
                   <a:srgbClr val="FFFFFF"/>
                 </a:solidFill>
               </a14:hiddenFill>
             </a:ext>
             <a:ext uri="{AF507438-7753-43e0-B8FC-AC1667EBCBE1}">
-              <a14:hiddenEffects xmlns="" xmlns:a14="http://schemas.microsoft.com/office/drawing/2010/main">
+              <a14:hiddenEffects xmlns:a14="http://schemas.microsoft.com/office/drawing/2010/main" xmlns="">
                 <a:effectLst>
                   <a:outerShdw dist="35921" dir="2700000" algn="ctr" rotWithShape="0">
                     <a:schemeClr val="bg2"/>
@@ -11237,12 +11645,12 @@
           <a:effectLst/>
           <a:extLst>
             <a:ext uri="{909E8E84-426E-40dd-AFC4-6F175D3DCCD1}">
-              <a14:hiddenFill xmlns="" xmlns:a14="http://schemas.microsoft.com/office/drawing/2010/main">
+              <a14:hiddenFill xmlns:a14="http://schemas.microsoft.com/office/drawing/2010/main" xmlns="">
                 <a:noFill/>
               </a14:hiddenFill>
             </a:ext>
             <a:ext uri="{AF507438-7753-43e0-B8FC-AC1667EBCBE1}">
-              <a14:hiddenEffects xmlns="" xmlns:a14="http://schemas.microsoft.com/office/drawing/2010/main">
+              <a14:hiddenEffects xmlns:a14="http://schemas.microsoft.com/office/drawing/2010/main" xmlns="">
                 <a:effectLst>
                   <a:outerShdw dist="35921" dir="2700000" algn="ctr" rotWithShape="0">
                     <a:schemeClr val="bg2"/>
@@ -11268,7 +11676,7 @@
 </p:sld>
 </file>
 
-<file path=ppt/slides/slide21.xml><?xml version="1.0" encoding="utf-8"?>
+<file path=ppt/slides/slide22.xml><?xml version="1.0" encoding="utf-8"?>
 <p:sld xmlns:a="http://schemas.openxmlformats.org/drawingml/2006/main" xmlns:r="http://schemas.openxmlformats.org/officeDocument/2006/relationships" xmlns:p="http://schemas.openxmlformats.org/presentationml/2006/main">
   <p:cSld>
     <p:spTree>
@@ -11307,7 +11715,7 @@
             <a:fld id="{1A0EDEF5-E59B-4A43-9F3E-607B2630313C}" type="slidenum">
               <a:rPr lang="de-DE"/>
               <a:pPr/>
-              <a:t>21</a:t>
+              <a:t>22</a:t>
             </a:fld>
             <a:endParaRPr lang="de-DE"/>
           </a:p>
@@ -11400,7 +11808,7 @@
 </p:sld>
 </file>
 
-<file path=ppt/slides/slide22.xml><?xml version="1.0" encoding="utf-8"?>
+<file path=ppt/slides/slide23.xml><?xml version="1.0" encoding="utf-8"?>
 <p:sld xmlns:a="http://schemas.openxmlformats.org/drawingml/2006/main" xmlns:r="http://schemas.openxmlformats.org/officeDocument/2006/relationships" xmlns:p="http://schemas.openxmlformats.org/presentationml/2006/main">
   <p:cSld>
     <p:spTree>
@@ -11439,7 +11847,7 @@
             <a:fld id="{899D31D1-3FF4-4E67-B8C1-69D719F87091}" type="slidenum">
               <a:rPr lang="de-DE"/>
               <a:pPr/>
-              <a:t>22</a:t>
+              <a:t>23</a:t>
             </a:fld>
             <a:endParaRPr lang="de-DE"/>
           </a:p>
@@ -11489,14 +11897,14 @@
           <a:ln/>
           <a:extLst>
             <a:ext uri="{909E8E84-426E-40dd-AFC4-6F175D3DCCD1}">
-              <a14:hiddenFill xmlns="" xmlns:a14="http://schemas.microsoft.com/office/drawing/2010/main">
+              <a14:hiddenFill xmlns:a14="http://schemas.microsoft.com/office/drawing/2010/main" xmlns="">
                 <a:solidFill>
                   <a:srgbClr val="FF9900"/>
                 </a:solidFill>
               </a14:hiddenFill>
             </a:ext>
             <a:ext uri="{91240B29-F687-4f45-9708-019B960494DF}">
-              <a14:hiddenLine xmlns="" xmlns:a14="http://schemas.microsoft.com/office/drawing/2010/main" w="9525">
+              <a14:hiddenLine xmlns:a14="http://schemas.microsoft.com/office/drawing/2010/main" xmlns="" w="9525">
                 <a:solidFill>
                   <a:srgbClr val="000000"/>
                 </a:solidFill>
@@ -11596,7 +12004,7 @@
 </p:sld>
 </file>
 
-<file path=ppt/slides/slide23.xml><?xml version="1.0" encoding="utf-8"?>
+<file path=ppt/slides/slide24.xml><?xml version="1.0" encoding="utf-8"?>
 <p:sld xmlns:a="http://schemas.openxmlformats.org/drawingml/2006/main" xmlns:r="http://schemas.openxmlformats.org/officeDocument/2006/relationships" xmlns:p="http://schemas.openxmlformats.org/presentationml/2006/main">
   <p:cSld>
     <p:spTree>
@@ -11635,7 +12043,7 @@
             <a:fld id="{E0DD92A3-CD9C-40B8-AD16-A19D054E677B}" type="slidenum">
               <a:rPr lang="de-DE"/>
               <a:pPr/>
-              <a:t>23</a:t>
+              <a:t>24</a:t>
             </a:fld>
             <a:endParaRPr lang="de-DE"/>
           </a:p>
@@ -11704,7 +12112,7 @@
 </p:sld>
 </file>
 
-<file path=ppt/slides/slide24.xml><?xml version="1.0" encoding="utf-8"?>
+<file path=ppt/slides/slide25.xml><?xml version="1.0" encoding="utf-8"?>
 <p:sld xmlns:a="http://schemas.openxmlformats.org/drawingml/2006/main" xmlns:r="http://schemas.openxmlformats.org/officeDocument/2006/relationships" xmlns:p="http://schemas.openxmlformats.org/presentationml/2006/main">
   <p:cSld>
     <p:spTree>
@@ -11743,7 +12151,7 @@
             <a:fld id="{A6DDC716-8D86-4CF3-9BE2-6F1AC9FA8D8A}" type="slidenum">
               <a:rPr lang="de-DE"/>
               <a:pPr/>
-              <a:t>24</a:t>
+              <a:t>25</a:t>
             </a:fld>
             <a:endParaRPr lang="de-DE"/>
           </a:p>
@@ -11806,28 +12214,28 @@
                 <a:gridCol w="1998662">
                   <a:extLst>
                     <a:ext uri="{9D8B030D-6E8A-4147-A177-3AD203B41FA5}">
-                      <a16:colId xmlns:a16="http://schemas.microsoft.com/office/drawing/2014/main" xmlns="" val="20000"/>
+                      <a16:colId xmlns:a16="http://schemas.microsoft.com/office/drawing/2014/main" val="20000"/>
                     </a:ext>
                   </a:extLst>
                 </a:gridCol>
                 <a:gridCol w="1998663">
                   <a:extLst>
                     <a:ext uri="{9D8B030D-6E8A-4147-A177-3AD203B41FA5}">
-                      <a16:colId xmlns:a16="http://schemas.microsoft.com/office/drawing/2014/main" xmlns="" val="20001"/>
+                      <a16:colId xmlns:a16="http://schemas.microsoft.com/office/drawing/2014/main" val="20001"/>
                     </a:ext>
                   </a:extLst>
                 </a:gridCol>
                 <a:gridCol w="1997075">
                   <a:extLst>
                     <a:ext uri="{9D8B030D-6E8A-4147-A177-3AD203B41FA5}">
-                      <a16:colId xmlns:a16="http://schemas.microsoft.com/office/drawing/2014/main" xmlns="" val="20002"/>
+                      <a16:colId xmlns:a16="http://schemas.microsoft.com/office/drawing/2014/main" val="20002"/>
                     </a:ext>
                   </a:extLst>
                 </a:gridCol>
                 <a:gridCol w="1998662">
                   <a:extLst>
                     <a:ext uri="{9D8B030D-6E8A-4147-A177-3AD203B41FA5}">
-                      <a16:colId xmlns:a16="http://schemas.microsoft.com/office/drawing/2014/main" xmlns="" val="20003"/>
+                      <a16:colId xmlns:a16="http://schemas.microsoft.com/office/drawing/2014/main" val="20003"/>
                     </a:ext>
                   </a:extLst>
                 </a:gridCol>
@@ -12112,7 +12520,7 @@
                 </a:tc>
                 <a:extLst>
                   <a:ext uri="{0D108BD9-81ED-4DB2-BD59-A6C34878D82A}">
-                    <a16:rowId xmlns:a16="http://schemas.microsoft.com/office/drawing/2014/main" xmlns="" val="10000"/>
+                    <a16:rowId xmlns:a16="http://schemas.microsoft.com/office/drawing/2014/main" val="10000"/>
                   </a:ext>
                 </a:extLst>
               </a:tr>
@@ -12481,7 +12889,7 @@
                 </a:tc>
                 <a:extLst>
                   <a:ext uri="{0D108BD9-81ED-4DB2-BD59-A6C34878D82A}">
-                    <a16:rowId xmlns:a16="http://schemas.microsoft.com/office/drawing/2014/main" xmlns="" val="10001"/>
+                    <a16:rowId xmlns:a16="http://schemas.microsoft.com/office/drawing/2014/main" val="10001"/>
                   </a:ext>
                 </a:extLst>
               </a:tr>
@@ -12863,7 +13271,7 @@
                 </a:tc>
                 <a:extLst>
                   <a:ext uri="{0D108BD9-81ED-4DB2-BD59-A6C34878D82A}">
-                    <a16:rowId xmlns:a16="http://schemas.microsoft.com/office/drawing/2014/main" xmlns="" val="10002"/>
+                    <a16:rowId xmlns:a16="http://schemas.microsoft.com/office/drawing/2014/main" val="10002"/>
                   </a:ext>
                 </a:extLst>
               </a:tr>
@@ -13229,7 +13637,7 @@
                 </a:tc>
                 <a:extLst>
                   <a:ext uri="{0D108BD9-81ED-4DB2-BD59-A6C34878D82A}">
-                    <a16:rowId xmlns:a16="http://schemas.microsoft.com/office/drawing/2014/main" xmlns="" val="10003"/>
+                    <a16:rowId xmlns:a16="http://schemas.microsoft.com/office/drawing/2014/main" val="10003"/>
                   </a:ext>
                 </a:extLst>
               </a:tr>
@@ -13611,7 +14019,7 @@
                 </a:tc>
                 <a:extLst>
                   <a:ext uri="{0D108BD9-81ED-4DB2-BD59-A6C34878D82A}">
-                    <a16:rowId xmlns:a16="http://schemas.microsoft.com/office/drawing/2014/main" xmlns="" val="10004"/>
+                    <a16:rowId xmlns:a16="http://schemas.microsoft.com/office/drawing/2014/main" val="10004"/>
                   </a:ext>
                 </a:extLst>
               </a:tr>
@@ -13980,7 +14388,7 @@
                 </a:tc>
                 <a:extLst>
                   <a:ext uri="{0D108BD9-81ED-4DB2-BD59-A6C34878D82A}">
-                    <a16:rowId xmlns:a16="http://schemas.microsoft.com/office/drawing/2014/main" xmlns="" val="10005"/>
+                    <a16:rowId xmlns:a16="http://schemas.microsoft.com/office/drawing/2014/main" val="10005"/>
                   </a:ext>
                 </a:extLst>
               </a:tr>
@@ -14362,7 +14770,7 @@
                 </a:tc>
                 <a:extLst>
                   <a:ext uri="{0D108BD9-81ED-4DB2-BD59-A6C34878D82A}">
-                    <a16:rowId xmlns:a16="http://schemas.microsoft.com/office/drawing/2014/main" xmlns="" val="10006"/>
+                    <a16:rowId xmlns:a16="http://schemas.microsoft.com/office/drawing/2014/main" val="10006"/>
                   </a:ext>
                 </a:extLst>
               </a:tr>
@@ -14378,7 +14786,7 @@
 </p:sld>
 </file>
 
-<file path=ppt/slides/slide25.xml><?xml version="1.0" encoding="utf-8"?>
+<file path=ppt/slides/slide26.xml><?xml version="1.0" encoding="utf-8"?>
 <p:sld xmlns:a="http://schemas.openxmlformats.org/drawingml/2006/main" xmlns:r="http://schemas.openxmlformats.org/officeDocument/2006/relationships" xmlns:p="http://schemas.openxmlformats.org/presentationml/2006/main">
   <p:cSld>
     <p:spTree>
@@ -14417,7 +14825,7 @@
             <a:fld id="{7C825A45-7494-4182-9A4A-AB4F72FEBB3C}" type="slidenum">
               <a:rPr lang="de-DE"/>
               <a:pPr/>
-              <a:t>25</a:t>
+              <a:t>26</a:t>
             </a:fld>
             <a:endParaRPr lang="de-DE"/>
           </a:p>
@@ -14586,21 +14994,21 @@
                 <a:gridCol w="1439862">
                   <a:extLst>
                     <a:ext uri="{9D8B030D-6E8A-4147-A177-3AD203B41FA5}">
-                      <a16:colId xmlns:a16="http://schemas.microsoft.com/office/drawing/2014/main" xmlns="" val="20000"/>
+                      <a16:colId xmlns:a16="http://schemas.microsoft.com/office/drawing/2014/main" val="20000"/>
                     </a:ext>
                   </a:extLst>
                 </a:gridCol>
                 <a:gridCol w="5761038">
                   <a:extLst>
                     <a:ext uri="{9D8B030D-6E8A-4147-A177-3AD203B41FA5}">
-                      <a16:colId xmlns:a16="http://schemas.microsoft.com/office/drawing/2014/main" xmlns="" val="20001"/>
+                      <a16:colId xmlns:a16="http://schemas.microsoft.com/office/drawing/2014/main" val="20001"/>
                     </a:ext>
                   </a:extLst>
                 </a:gridCol>
                 <a:gridCol w="1223962">
                   <a:extLst>
                     <a:ext uri="{9D8B030D-6E8A-4147-A177-3AD203B41FA5}">
-                      <a16:colId xmlns:a16="http://schemas.microsoft.com/office/drawing/2014/main" xmlns="" val="20002"/>
+                      <a16:colId xmlns:a16="http://schemas.microsoft.com/office/drawing/2014/main" val="20002"/>
                     </a:ext>
                   </a:extLst>
                 </a:gridCol>
@@ -15290,7 +15698,7 @@
                 </a:tc>
                 <a:extLst>
                   <a:ext uri="{0D108BD9-81ED-4DB2-BD59-A6C34878D82A}">
-                    <a16:rowId xmlns:a16="http://schemas.microsoft.com/office/drawing/2014/main" xmlns="" val="10000"/>
+                    <a16:rowId xmlns:a16="http://schemas.microsoft.com/office/drawing/2014/main" val="10000"/>
                   </a:ext>
                 </a:extLst>
               </a:tr>
@@ -15500,21 +15908,21 @@
                 <a:gridCol w="1439862">
                   <a:extLst>
                     <a:ext uri="{9D8B030D-6E8A-4147-A177-3AD203B41FA5}">
-                      <a16:colId xmlns:a16="http://schemas.microsoft.com/office/drawing/2014/main" xmlns="" val="20000"/>
+                      <a16:colId xmlns:a16="http://schemas.microsoft.com/office/drawing/2014/main" val="20000"/>
                     </a:ext>
                   </a:extLst>
                 </a:gridCol>
                 <a:gridCol w="5761038">
                   <a:extLst>
                     <a:ext uri="{9D8B030D-6E8A-4147-A177-3AD203B41FA5}">
-                      <a16:colId xmlns:a16="http://schemas.microsoft.com/office/drawing/2014/main" xmlns="" val="20001"/>
+                      <a16:colId xmlns:a16="http://schemas.microsoft.com/office/drawing/2014/main" val="20001"/>
                     </a:ext>
                   </a:extLst>
                 </a:gridCol>
                 <a:gridCol w="1223962">
                   <a:extLst>
                     <a:ext uri="{9D8B030D-6E8A-4147-A177-3AD203B41FA5}">
-                      <a16:colId xmlns:a16="http://schemas.microsoft.com/office/drawing/2014/main" xmlns="" val="20002"/>
+                      <a16:colId xmlns:a16="http://schemas.microsoft.com/office/drawing/2014/main" val="20002"/>
                     </a:ext>
                   </a:extLst>
                 </a:gridCol>
@@ -16436,7 +16844,7 @@
                 </a:tc>
                 <a:extLst>
                   <a:ext uri="{0D108BD9-81ED-4DB2-BD59-A6C34878D82A}">
-                    <a16:rowId xmlns:a16="http://schemas.microsoft.com/office/drawing/2014/main" xmlns="" val="10000"/>
+                    <a16:rowId xmlns:a16="http://schemas.microsoft.com/office/drawing/2014/main" val="10000"/>
                   </a:ext>
                 </a:extLst>
               </a:tr>
@@ -16560,6 +16968,17 @@
         <p:txBody>
           <a:bodyPr/>
           <a:lstStyle/>
+          <a:p>
+            <a:pPr marL="285750" indent="-285750">
+              <a:buFont typeface="Arial" panose="020B0604020202020204" pitchFamily="34" charset="0"/>
+              <a:buChar char="•"/>
+            </a:pPr>
+            <a:r>
+              <a:rPr lang="de-DE" dirty="0"/>
+              <a:t>Für Asymmetrische Verschlüsselung</a:t>
+            </a:r>
+            <a:endParaRPr lang="de-DE" dirty="0" smtClean="0"/>
+          </a:p>
           <a:p>
             <a:pPr marL="285750" indent="-285750">
               <a:buFont typeface="Arial" panose="020B0604020202020204" pitchFamily="34" charset="0"/>
@@ -16806,8 +17225,8 @@
           </a:p>
         </p:txBody>
       </p:sp>
-      <mc:AlternateContent xmlns:mc="http://schemas.openxmlformats.org/markup-compatibility/2006">
-        <mc:Choice xmlns:a14="http://schemas.microsoft.com/office/drawing/2010/main" Requires="a14">
+      <mc:AlternateContent xmlns:mc="http://schemas.openxmlformats.org/markup-compatibility/2006" xmlns:a14="http://schemas.microsoft.com/office/drawing/2010/main">
+        <mc:Choice Requires="a14">
           <p:sp>
             <p:nvSpPr>
               <p:cNvPr id="9219" name="Rectangle 3"/>
@@ -16986,7 +17405,7 @@
             </p:txBody>
           </p:sp>
         </mc:Choice>
-        <mc:Fallback>
+        <mc:Fallback xmlns="">
           <p:sp>
             <p:nvSpPr>
               <p:cNvPr id="9219" name="Rectangle 3"/>
@@ -17145,20 +17564,8 @@
               <a:buNone/>
             </a:pPr>
             <a:r>
-              <a:rPr lang="en-US" dirty="0" err="1" smtClean="0"/>
-              <a:t>Spezialfälle</a:t>
-            </a:r>
-            <a:r>
-              <a:rPr lang="en-US" dirty="0" smtClean="0"/>
-              <a:t> </a:t>
-            </a:r>
-            <a:r>
-              <a:rPr lang="en-US" dirty="0" err="1" smtClean="0"/>
-              <a:t>bei</a:t>
-            </a:r>
-            <a:r>
-              <a:rPr lang="en-US" dirty="0" smtClean="0"/>
-              <a:t> der Addition:</a:t>
+              <a:rPr lang="de-DE" dirty="0" smtClean="0"/>
+              <a:t>Spezialfälle bei der Addition:</a:t>
             </a:r>
           </a:p>
           <a:p>
@@ -17173,19 +17580,15 @@
               <a:buNone/>
             </a:pPr>
             <a:r>
-              <a:rPr lang="de-DE" dirty="0"/>
+              <a:rPr lang="de-DE" dirty="0" smtClean="0"/>
               <a:t>S = P + P = 2P.</a:t>
             </a:r>
           </a:p>
           <a:p>
             <a:pPr marL="912813" lvl="2" indent="-285750"/>
             <a:r>
-              <a:rPr lang="de-DE" dirty="0"/>
-              <a:t>Addieren mit dem gleichen X-Koordinaten </a:t>
-            </a:r>
-            <a:r>
               <a:rPr lang="de-DE" dirty="0" smtClean="0"/>
-              <a:t>(Q</a:t>
+              <a:t>Addieren mit dem gleichen X-Koordinaten (Q</a:t>
             </a:r>
             <a:r>
               <a:rPr lang="de-DE" baseline="-25000" dirty="0" smtClean="0"/>
@@ -17193,15 +17596,7 @@
             </a:r>
             <a:r>
               <a:rPr lang="de-DE" dirty="0" smtClean="0"/>
-              <a:t> </a:t>
-            </a:r>
-            <a:r>
-              <a:rPr lang="de-DE" dirty="0"/>
-              <a:t>= </a:t>
-            </a:r>
-            <a:r>
-              <a:rPr lang="de-DE" dirty="0" smtClean="0"/>
-              <a:t>P</a:t>
+              <a:t> = P</a:t>
             </a:r>
             <a:r>
               <a:rPr lang="de-DE" baseline="-25000" dirty="0" smtClean="0"/>
@@ -17217,27 +17612,27 @@
               <a:buNone/>
             </a:pPr>
             <a:r>
-              <a:rPr lang="en-US" dirty="0"/>
+              <a:rPr lang="de-DE" dirty="0" smtClean="0"/>
               <a:t>P + Q = </a:t>
             </a:r>
             <a:r>
-              <a:rPr lang="en-US" sz="2800" dirty="0" smtClean="0"/>
+              <a:rPr lang="de-DE" sz="2800" dirty="0" smtClean="0"/>
               <a:t>∞</a:t>
             </a:r>
-            <a:endParaRPr lang="en-US" dirty="0"/>
+            <a:endParaRPr lang="de-DE" dirty="0" smtClean="0"/>
           </a:p>
           <a:p>
             <a:pPr marL="1360488" lvl="3" indent="-285750"/>
             <a:r>
-              <a:rPr lang="de-DE" dirty="0"/>
+              <a:rPr lang="de-DE" dirty="0" smtClean="0"/>
               <a:t>Addieren mit </a:t>
             </a:r>
             <a:r>
-              <a:rPr lang="en-US" sz="2800" dirty="0" smtClean="0"/>
+              <a:rPr lang="de-DE" sz="2800" dirty="0" smtClean="0"/>
               <a:t>∞</a:t>
             </a:r>
             <a:r>
-              <a:rPr lang="en-US" sz="1800" dirty="0" smtClean="0"/>
+              <a:rPr lang="de-DE" sz="1800" dirty="0" smtClean="0"/>
               <a:t> </a:t>
             </a:r>
             <a:r>
@@ -17254,7 +17649,7 @@
               <a:t>P + </a:t>
             </a:r>
             <a:r>
-              <a:rPr lang="en-US" sz="2800" dirty="0" smtClean="0"/>
+              <a:rPr lang="de-DE" sz="2800" dirty="0" smtClean="0"/>
               <a:t>∞</a:t>
             </a:r>
             <a:r>
@@ -17281,43 +17676,15 @@
             <a:pPr marL="1360488" lvl="3" indent="-285750"/>
             <a:r>
               <a:rPr lang="de-DE" dirty="0" smtClean="0"/>
-              <a:t>Aus </a:t>
-            </a:r>
-            <a:r>
-              <a:rPr lang="en-US" dirty="0"/>
-              <a:t>P + Q = </a:t>
-            </a:r>
-            <a:r>
-              <a:rPr lang="en-US" sz="2800" dirty="0" smtClean="0"/>
+              <a:t>Aus P + Q = </a:t>
+            </a:r>
+            <a:r>
+              <a:rPr lang="de-DE" sz="2800" dirty="0" smtClean="0"/>
               <a:t>∞</a:t>
             </a:r>
             <a:r>
-              <a:rPr lang="en-US" dirty="0" smtClean="0"/>
-              <a:t> </a:t>
-            </a:r>
-            <a:r>
-              <a:rPr lang="en-US" dirty="0" err="1" smtClean="0"/>
-              <a:t>folgt</a:t>
-            </a:r>
-            <a:r>
-              <a:rPr lang="en-US" dirty="0" smtClean="0"/>
-              <a:t>, </a:t>
-            </a:r>
-            <a:r>
-              <a:rPr lang="en-US" dirty="0" err="1" smtClean="0"/>
-              <a:t>dass</a:t>
-            </a:r>
-            <a:r>
-              <a:rPr lang="en-US" dirty="0" smtClean="0"/>
-              <a:t> </a:t>
-            </a:r>
-            <a:r>
-              <a:rPr lang="de-DE" dirty="0"/>
-              <a:t>Q das inverse Element von P ist und es </a:t>
-            </a:r>
-            <a:r>
               <a:rPr lang="de-DE" dirty="0" smtClean="0"/>
-              <a:t>gilt:</a:t>
+              <a:t> folgt, dass Q das inverse Element von P ist und es gilt:</a:t>
             </a:r>
           </a:p>
           <a:p>
@@ -17326,21 +17693,8 @@
             </a:pPr>
             <a:r>
               <a:rPr lang="de-DE" dirty="0" smtClean="0"/>
-              <a:t>Q </a:t>
-            </a:r>
-            <a:r>
-              <a:rPr lang="de-DE" dirty="0"/>
-              <a:t>= </a:t>
-            </a:r>
-            <a:r>
-              <a:rPr lang="de-DE" dirty="0" smtClean="0"/>
-              <a:t>-</a:t>
-            </a:r>
-            <a:r>
-              <a:rPr lang="de-DE" dirty="0"/>
-              <a:t>P</a:t>
-            </a:r>
-            <a:endParaRPr lang="en-US" dirty="0" smtClean="0"/>
+              <a:t>Q = -P</a:t>
+            </a:r>
           </a:p>
           <a:p>
             <a:pPr lvl="1" indent="0">
@@ -17348,7 +17702,11 @@
             </a:pPr>
             <a:r>
               <a:rPr lang="de-DE" dirty="0" smtClean="0"/>
-              <a:t>Addieren mit </a:t>
+              <a:t>Addieren </a:t>
+            </a:r>
+            <a:r>
+              <a:rPr lang="de-DE" dirty="0" smtClean="0"/>
+              <a:t>mit </a:t>
             </a:r>
             <a:r>
               <a:rPr lang="de-DE" dirty="0"/>
@@ -18076,7 +18434,7 @@
         <a:effectLst/>
         <a:extLst>
           <a:ext uri="{AF507438-7753-43e0-B8FC-AC1667EBCBE1}">
-            <a14:hiddenEffects xmlns="" xmlns:a14="http://schemas.microsoft.com/office/drawing/2010/main">
+            <a14:hiddenEffects xmlns:a14="http://schemas.microsoft.com/office/drawing/2010/main" xmlns="">
               <a:effectLst>
                 <a:outerShdw dist="35921" dir="2700000" algn="ctr" rotWithShape="0">
                   <a:schemeClr val="bg2"/>
@@ -18149,7 +18507,7 @@
         <a:effectLst/>
         <a:extLst>
           <a:ext uri="{AF507438-7753-43e0-B8FC-AC1667EBCBE1}">
-            <a14:hiddenEffects xmlns="" xmlns:a14="http://schemas.microsoft.com/office/drawing/2010/main">
+            <a14:hiddenEffects xmlns:a14="http://schemas.microsoft.com/office/drawing/2010/main" xmlns="">
               <a:effectLst>
                 <a:outerShdw dist="35921" dir="2700000" algn="ctr" rotWithShape="0">
                   <a:schemeClr val="bg2"/>
@@ -18523,4 +18881,265 @@
   <a:objectDefaults/>
   <a:extraClrSchemeLst/>
 </a:theme>
+</file>
+
+<file path=ppt/theme/theme3.xml><?xml version="1.0" encoding="utf-8"?>
+<a:theme xmlns:a="http://schemas.openxmlformats.org/drawingml/2006/main" name="Office">
+  <a:themeElements>
+    <a:clrScheme name="Office">
+      <a:dk1>
+        <a:sysClr val="windowText" lastClr="000000"/>
+      </a:dk1>
+      <a:lt1>
+        <a:sysClr val="window" lastClr="FFFFFF"/>
+      </a:lt1>
+      <a:dk2>
+        <a:srgbClr val="44546A"/>
+      </a:dk2>
+      <a:lt2>
+        <a:srgbClr val="E7E6E6"/>
+      </a:lt2>
+      <a:accent1>
+        <a:srgbClr val="5B9BD5"/>
+      </a:accent1>
+      <a:accent2>
+        <a:srgbClr val="ED7D31"/>
+      </a:accent2>
+      <a:accent3>
+        <a:srgbClr val="A5A5A5"/>
+      </a:accent3>
+      <a:accent4>
+        <a:srgbClr val="FFC000"/>
+      </a:accent4>
+      <a:accent5>
+        <a:srgbClr val="4472C4"/>
+      </a:accent5>
+      <a:accent6>
+        <a:srgbClr val="70AD47"/>
+      </a:accent6>
+      <a:hlink>
+        <a:srgbClr val="0563C1"/>
+      </a:hlink>
+      <a:folHlink>
+        <a:srgbClr val="954F72"/>
+      </a:folHlink>
+    </a:clrScheme>
+    <a:fontScheme name="Office">
+      <a:majorFont>
+        <a:latin typeface="Calibri Light" panose="020F0302020204030204"/>
+        <a:ea typeface=""/>
+        <a:cs typeface=""/>
+        <a:font script="Jpan" typeface="游ゴシック Light"/>
+        <a:font script="Hang" typeface="맑은 고딕"/>
+        <a:font script="Hans" typeface="等线 Light"/>
+        <a:font script="Hant" typeface="新細明體"/>
+        <a:font script="Arab" typeface="Times New Roman"/>
+        <a:font script="Hebr" typeface="Times New Roman"/>
+        <a:font script="Thai" typeface="Angsana New"/>
+        <a:font script="Ethi" typeface="Nyala"/>
+        <a:font script="Beng" typeface="Vrinda"/>
+        <a:font script="Gujr" typeface="Shruti"/>
+        <a:font script="Khmr" typeface="MoolBoran"/>
+        <a:font script="Knda" typeface="Tunga"/>
+        <a:font script="Guru" typeface="Raavi"/>
+        <a:font script="Cans" typeface="Euphemia"/>
+        <a:font script="Cher" typeface="Plantagenet Cherokee"/>
+        <a:font script="Yiii" typeface="Microsoft Yi Baiti"/>
+        <a:font script="Tibt" typeface="Microsoft Himalaya"/>
+        <a:font script="Thaa" typeface="MV Boli"/>
+        <a:font script="Deva" typeface="Mangal"/>
+        <a:font script="Telu" typeface="Gautami"/>
+        <a:font script="Taml" typeface="Latha"/>
+        <a:font script="Syrc" typeface="Estrangelo Edessa"/>
+        <a:font script="Orya" typeface="Kalinga"/>
+        <a:font script="Mlym" typeface="Kartika"/>
+        <a:font script="Laoo" typeface="DokChampa"/>
+        <a:font script="Sinh" typeface="Iskoola Pota"/>
+        <a:font script="Mong" typeface="Mongolian Baiti"/>
+        <a:font script="Viet" typeface="Times New Roman"/>
+        <a:font script="Uigh" typeface="Microsoft Uighur"/>
+        <a:font script="Geor" typeface="Sylfaen"/>
+      </a:majorFont>
+      <a:minorFont>
+        <a:latin typeface="Calibri" panose="020F0502020204030204"/>
+        <a:ea typeface=""/>
+        <a:cs typeface=""/>
+        <a:font script="Jpan" typeface="游ゴシック"/>
+        <a:font script="Hang" typeface="맑은 고딕"/>
+        <a:font script="Hans" typeface="等线"/>
+        <a:font script="Hant" typeface="新細明體"/>
+        <a:font script="Arab" typeface="Arial"/>
+        <a:font script="Hebr" typeface="Arial"/>
+        <a:font script="Thai" typeface="Cordia New"/>
+        <a:font script="Ethi" typeface="Nyala"/>
+        <a:font script="Beng" typeface="Vrinda"/>
+        <a:font script="Gujr" typeface="Shruti"/>
+        <a:font script="Khmr" typeface="DaunPenh"/>
+        <a:font script="Knda" typeface="Tunga"/>
+        <a:font script="Guru" typeface="Raavi"/>
+        <a:font script="Cans" typeface="Euphemia"/>
+        <a:font script="Cher" typeface="Plantagenet Cherokee"/>
+        <a:font script="Yiii" typeface="Microsoft Yi Baiti"/>
+        <a:font script="Tibt" typeface="Microsoft Himalaya"/>
+        <a:font script="Thaa" typeface="MV Boli"/>
+        <a:font script="Deva" typeface="Mangal"/>
+        <a:font script="Telu" typeface="Gautami"/>
+        <a:font script="Taml" typeface="Latha"/>
+        <a:font script="Syrc" typeface="Estrangelo Edessa"/>
+        <a:font script="Orya" typeface="Kalinga"/>
+        <a:font script="Mlym" typeface="Kartika"/>
+        <a:font script="Laoo" typeface="DokChampa"/>
+        <a:font script="Sinh" typeface="Iskoola Pota"/>
+        <a:font script="Mong" typeface="Mongolian Baiti"/>
+        <a:font script="Viet" typeface="Arial"/>
+        <a:font script="Uigh" typeface="Microsoft Uighur"/>
+        <a:font script="Geor" typeface="Sylfaen"/>
+      </a:minorFont>
+    </a:fontScheme>
+    <a:fmtScheme name="Office">
+      <a:fillStyleLst>
+        <a:solidFill>
+          <a:schemeClr val="phClr"/>
+        </a:solidFill>
+        <a:gradFill rotWithShape="1">
+          <a:gsLst>
+            <a:gs pos="0">
+              <a:schemeClr val="phClr">
+                <a:lumMod val="110000"/>
+                <a:satMod val="105000"/>
+                <a:tint val="67000"/>
+              </a:schemeClr>
+            </a:gs>
+            <a:gs pos="50000">
+              <a:schemeClr val="phClr">
+                <a:lumMod val="105000"/>
+                <a:satMod val="103000"/>
+                <a:tint val="73000"/>
+              </a:schemeClr>
+            </a:gs>
+            <a:gs pos="100000">
+              <a:schemeClr val="phClr">
+                <a:lumMod val="105000"/>
+                <a:satMod val="109000"/>
+                <a:tint val="81000"/>
+              </a:schemeClr>
+            </a:gs>
+          </a:gsLst>
+          <a:lin ang="5400000" scaled="0"/>
+        </a:gradFill>
+        <a:gradFill rotWithShape="1">
+          <a:gsLst>
+            <a:gs pos="0">
+              <a:schemeClr val="phClr">
+                <a:satMod val="103000"/>
+                <a:lumMod val="102000"/>
+                <a:tint val="94000"/>
+              </a:schemeClr>
+            </a:gs>
+            <a:gs pos="50000">
+              <a:schemeClr val="phClr">
+                <a:satMod val="110000"/>
+                <a:lumMod val="100000"/>
+                <a:shade val="100000"/>
+              </a:schemeClr>
+            </a:gs>
+            <a:gs pos="100000">
+              <a:schemeClr val="phClr">
+                <a:lumMod val="99000"/>
+                <a:satMod val="120000"/>
+                <a:shade val="78000"/>
+              </a:schemeClr>
+            </a:gs>
+          </a:gsLst>
+          <a:lin ang="5400000" scaled="0"/>
+        </a:gradFill>
+      </a:fillStyleLst>
+      <a:lnStyleLst>
+        <a:ln w="6350" cap="flat" cmpd="sng" algn="ctr">
+          <a:solidFill>
+            <a:schemeClr val="phClr"/>
+          </a:solidFill>
+          <a:prstDash val="solid"/>
+          <a:miter lim="800000"/>
+        </a:ln>
+        <a:ln w="12700" cap="flat" cmpd="sng" algn="ctr">
+          <a:solidFill>
+            <a:schemeClr val="phClr"/>
+          </a:solidFill>
+          <a:prstDash val="solid"/>
+          <a:miter lim="800000"/>
+        </a:ln>
+        <a:ln w="19050" cap="flat" cmpd="sng" algn="ctr">
+          <a:solidFill>
+            <a:schemeClr val="phClr"/>
+          </a:solidFill>
+          <a:prstDash val="solid"/>
+          <a:miter lim="800000"/>
+        </a:ln>
+      </a:lnStyleLst>
+      <a:effectStyleLst>
+        <a:effectStyle>
+          <a:effectLst/>
+        </a:effectStyle>
+        <a:effectStyle>
+          <a:effectLst/>
+        </a:effectStyle>
+        <a:effectStyle>
+          <a:effectLst>
+            <a:outerShdw blurRad="57150" dist="19050" dir="5400000" algn="ctr" rotWithShape="0">
+              <a:srgbClr val="000000">
+                <a:alpha val="63000"/>
+              </a:srgbClr>
+            </a:outerShdw>
+          </a:effectLst>
+        </a:effectStyle>
+      </a:effectStyleLst>
+      <a:bgFillStyleLst>
+        <a:solidFill>
+          <a:schemeClr val="phClr"/>
+        </a:solidFill>
+        <a:solidFill>
+          <a:schemeClr val="phClr">
+            <a:tint val="95000"/>
+            <a:satMod val="170000"/>
+          </a:schemeClr>
+        </a:solidFill>
+        <a:gradFill rotWithShape="1">
+          <a:gsLst>
+            <a:gs pos="0">
+              <a:schemeClr val="phClr">
+                <a:tint val="93000"/>
+                <a:satMod val="150000"/>
+                <a:shade val="98000"/>
+                <a:lumMod val="102000"/>
+              </a:schemeClr>
+            </a:gs>
+            <a:gs pos="50000">
+              <a:schemeClr val="phClr">
+                <a:tint val="98000"/>
+                <a:satMod val="130000"/>
+                <a:shade val="90000"/>
+                <a:lumMod val="103000"/>
+              </a:schemeClr>
+            </a:gs>
+            <a:gs pos="100000">
+              <a:schemeClr val="phClr">
+                <a:shade val="63000"/>
+                <a:satMod val="120000"/>
+              </a:schemeClr>
+            </a:gs>
+          </a:gsLst>
+          <a:lin ang="5400000" scaled="0"/>
+        </a:gradFill>
+      </a:bgFillStyleLst>
+    </a:fmtScheme>
+  </a:themeElements>
+  <a:objectDefaults/>
+  <a:extraClrSchemeLst/>
+  <a:extLst>
+    <a:ext uri="{05A4C25C-085E-4340-85A3-A5531E510DB2}">
+      <thm15:themeFamily xmlns:thm15="http://schemas.microsoft.com/office/thememl/2012/main" name="Office Theme" id="{62F939B6-93AF-4DB8-9C6B-D6C7DFDC589F}" vid="{4A3C46E8-61CC-4603-A589-7422A47A8E4A}"/>
+    </a:ext>
+  </a:extLst>
+</a:theme>
 </file>
</xml_diff>